<commit_message>
add handler for create and update exam, asignment, lesson
</commit_message>
<xml_diff>
--- a/ceft/New Microsoft PowerPoint Presentation (1).pptx
+++ b/ceft/New Microsoft PowerPoint Presentation (1).pptx
@@ -5,40 +5,20 @@
     <p:sldMasterId id="2147483659" r:id="rId1"/>
   </p:sldMasterIdLst>
   <p:notesMasterIdLst>
-    <p:notesMasterId r:id="rId4"/>
+    <p:notesMasterId r:id="rId3"/>
   </p:notesMasterIdLst>
   <p:sldIdLst>
-    <p:sldId id="256" r:id="rId2"/>
-    <p:sldId id="257" r:id="rId3"/>
+    <p:sldId id="257" r:id="rId2"/>
   </p:sldIdLst>
   <p:sldSz cx="9144000" cy="6858000" type="screen4x3"/>
   <p:notesSz cx="6858000" cy="9144000"/>
   <p:embeddedFontLst>
     <p:embeddedFont>
-      <p:font typeface="Tahoma" panose="020B0604030504040204" pitchFamily="34" charset="0"/>
-      <p:regular r:id="rId5"/>
-      <p:bold r:id="rId6"/>
-    </p:embeddedFont>
-    <p:embeddedFont>
-      <p:font typeface="Open Sans Medium" panose="020B0604020202020204" charset="0"/>
-      <p:regular r:id="rId7"/>
-      <p:bold r:id="rId8"/>
-      <p:italic r:id="rId9"/>
-      <p:boldItalic r:id="rId10"/>
-    </p:embeddedFont>
-    <p:embeddedFont>
       <p:font typeface="Calibri" panose="020F0502020204030204" pitchFamily="34" charset="0"/>
-      <p:regular r:id="rId11"/>
-      <p:bold r:id="rId12"/>
-      <p:italic r:id="rId13"/>
-      <p:boldItalic r:id="rId14"/>
-    </p:embeddedFont>
-    <p:embeddedFont>
-      <p:font typeface="Open Sans" panose="020B0604020202020204" charset="0"/>
-      <p:regular r:id="rId15"/>
-      <p:bold r:id="rId16"/>
-      <p:italic r:id="rId17"/>
-      <p:boldItalic r:id="rId18"/>
+      <p:regular r:id="rId4"/>
+      <p:bold r:id="rId5"/>
+      <p:italic r:id="rId6"/>
+      <p:boldItalic r:id="rId7"/>
     </p:embeddedFont>
   </p:embeddedFontLst>
   <p:defaultTextStyle>
@@ -1472,195 +1452,6 @@
 </file>
 
 <file path=ppt/notesSlides/notesSlide1.xml><?xml version="1.0" encoding="utf-8"?>
-<p:notes xmlns:a="http://schemas.openxmlformats.org/drawingml/2006/main" xmlns:r="http://schemas.openxmlformats.org/officeDocument/2006/relationships" xmlns:p="http://schemas.openxmlformats.org/presentationml/2006/main" showMasterSp="0" showMasterPhAnim="0">
-  <p:cSld>
-    <p:spTree>
-      <p:nvGrpSpPr>
-        <p:cNvPr id="1" name="Shape 84"/>
-        <p:cNvGrpSpPr/>
-        <p:nvPr/>
-      </p:nvGrpSpPr>
-      <p:grpSpPr>
-        <a:xfrm>
-          <a:off x="0" y="0"/>
-          <a:ext cx="0" cy="0"/>
-          <a:chOff x="0" y="0"/>
-          <a:chExt cx="0" cy="0"/>
-        </a:xfrm>
-      </p:grpSpPr>
-      <p:sp>
-        <p:nvSpPr>
-          <p:cNvPr id="85" name="Google Shape;85;p1:notes"/>
-          <p:cNvSpPr>
-            <a:spLocks noGrp="1" noRot="1" noChangeAspect="1"/>
-          </p:cNvSpPr>
-          <p:nvPr>
-            <p:ph type="sldImg" idx="2"/>
-          </p:nvPr>
-        </p:nvSpPr>
-        <p:spPr>
-          <a:xfrm>
-            <a:off x="1371600" y="1143000"/>
-            <a:ext cx="4114800" cy="3086100"/>
-          </a:xfrm>
-          <a:custGeom>
-            <a:avLst/>
-            <a:gdLst/>
-            <a:ahLst/>
-            <a:cxnLst/>
-            <a:rect l="l" t="t" r="r" b="b"/>
-            <a:pathLst>
-              <a:path w="120000" h="120000" extrusionOk="0">
-                <a:moveTo>
-                  <a:pt x="0" y="0"/>
-                </a:moveTo>
-                <a:lnTo>
-                  <a:pt x="120000" y="0"/>
-                </a:lnTo>
-                <a:lnTo>
-                  <a:pt x="120000" y="120000"/>
-                </a:lnTo>
-                <a:lnTo>
-                  <a:pt x="0" y="120000"/>
-                </a:lnTo>
-                <a:close/>
-              </a:path>
-            </a:pathLst>
-          </a:custGeom>
-          <a:noFill/>
-          <a:ln w="12700" cap="flat" cmpd="sng">
-            <a:solidFill>
-              <a:srgbClr val="000000"/>
-            </a:solidFill>
-            <a:prstDash val="solid"/>
-            <a:round/>
-            <a:headEnd type="none" w="sm" len="sm"/>
-            <a:tailEnd type="none" w="sm" len="sm"/>
-          </a:ln>
-        </p:spPr>
-      </p:sp>
-      <p:sp>
-        <p:nvSpPr>
-          <p:cNvPr id="86" name="Google Shape;86;p1:notes"/>
-          <p:cNvSpPr txBox="1">
-            <a:spLocks noGrp="1"/>
-          </p:cNvSpPr>
-          <p:nvPr>
-            <p:ph type="body" idx="1"/>
-          </p:nvPr>
-        </p:nvSpPr>
-        <p:spPr>
-          <a:xfrm>
-            <a:off x="685800" y="4400550"/>
-            <a:ext cx="5486400" cy="3600450"/>
-          </a:xfrm>
-          <a:prstGeom prst="rect">
-            <a:avLst/>
-          </a:prstGeom>
-          <a:noFill/>
-          <a:ln>
-            <a:noFill/>
-          </a:ln>
-        </p:spPr>
-        <p:txBody>
-          <a:bodyPr spcFirstLastPara="1" wrap="square" lIns="91425" tIns="45700" rIns="91425" bIns="45700" anchor="t" anchorCtr="0">
-            <a:noAutofit/>
-          </a:bodyPr>
-          <a:lstStyle/>
-          <a:p>
-            <a:pPr marL="0" lvl="0" indent="0" algn="l" rtl="0">
-              <a:spcBef>
-                <a:spcPts val="0"/>
-              </a:spcBef>
-              <a:spcAft>
-                <a:spcPts val="0"/>
-              </a:spcAft>
-              <a:buNone/>
-            </a:pPr>
-            <a:r>
-              <a:rPr lang="en-US"/>
-              <a:t>Cuong Le Van (Mr.)</a:t>
-            </a:r>
-            <a:endParaRPr/>
-          </a:p>
-          <a:p>
-            <a:pPr marL="0" lvl="0" indent="0" algn="l" rtl="0">
-              <a:spcBef>
-                <a:spcPts val="0"/>
-              </a:spcBef>
-              <a:spcAft>
-                <a:spcPts val="0"/>
-              </a:spcAft>
-              <a:buNone/>
-            </a:pPr>
-            <a:r>
-              <a:rPr lang="en-US">
-                <a:latin typeface="Arial"/>
-                <a:ea typeface="Arial"/>
-                <a:cs typeface="Arial"/>
-                <a:sym typeface="Arial"/>
-              </a:rPr>
-              <a:t>Google Developer Student Clubs  HCMUTE Lead</a:t>
-            </a:r>
-            <a:endParaRPr/>
-          </a:p>
-        </p:txBody>
-      </p:sp>
-      <p:sp>
-        <p:nvSpPr>
-          <p:cNvPr id="87" name="Google Shape;87;p1:notes"/>
-          <p:cNvSpPr txBox="1">
-            <a:spLocks noGrp="1"/>
-          </p:cNvSpPr>
-          <p:nvPr>
-            <p:ph type="sldNum" idx="12"/>
-          </p:nvPr>
-        </p:nvSpPr>
-        <p:spPr>
-          <a:xfrm>
-            <a:off x="3884613" y="8685213"/>
-            <a:ext cx="2971800" cy="458787"/>
-          </a:xfrm>
-          <a:prstGeom prst="rect">
-            <a:avLst/>
-          </a:prstGeom>
-          <a:noFill/>
-          <a:ln>
-            <a:noFill/>
-          </a:ln>
-        </p:spPr>
-        <p:txBody>
-          <a:bodyPr spcFirstLastPara="1" wrap="square" lIns="91425" tIns="45700" rIns="91425" bIns="45700" anchor="b" anchorCtr="0">
-            <a:noAutofit/>
-          </a:bodyPr>
-          <a:lstStyle/>
-          <a:p>
-            <a:pPr marL="0" lvl="0" indent="0" algn="r" rtl="0">
-              <a:spcBef>
-                <a:spcPts val="0"/>
-              </a:spcBef>
-              <a:spcAft>
-                <a:spcPts val="0"/>
-              </a:spcAft>
-              <a:buNone/>
-            </a:pPr>
-            <a:fld id="{00000000-1234-1234-1234-123412341234}" type="slidenum">
-              <a:rPr lang="en-US"/>
-              <a:t>1</a:t>
-            </a:fld>
-            <a:endParaRPr/>
-          </a:p>
-        </p:txBody>
-      </p:sp>
-    </p:spTree>
-  </p:cSld>
-  <p:clrMapOvr>
-    <a:masterClrMapping/>
-  </p:clrMapOvr>
-</p:notes>
-</file>
-
-<file path=ppt/notesSlides/notesSlide2.xml><?xml version="1.0" encoding="utf-8"?>
 <p:notes xmlns:a="http://schemas.openxmlformats.org/drawingml/2006/main" xmlns:r="http://schemas.openxmlformats.org/officeDocument/2006/relationships" xmlns:p="http://schemas.openxmlformats.org/presentationml/2006/main">
   <p:cSld>
     <p:spTree>
@@ -1710,14 +1501,9 @@
           <a:lstStyle/>
           <a:p>
             <a:r>
-              <a:rPr lang="en-US" smtClean="0"/>
-              <a:t>Chief</a:t>
+              <a:rPr lang="en-US"/>
+              <a:t>Lê Văn Cường</a:t>
             </a:r>
-            <a:r>
-              <a:rPr lang="en-US" baseline="0" smtClean="0"/>
-              <a:t> Delivery Officer</a:t>
-            </a:r>
-            <a:endParaRPr lang="en-US"/>
           </a:p>
         </p:txBody>
       </p:sp>
@@ -1755,7 +1541,7 @@
                 <a:cs typeface="Calibri"/>
                 <a:sym typeface="Calibri"/>
               </a:rPr>
-              <a:t>2</a:t>
+              <a:t>1</a:t>
             </a:fld>
             <a:endParaRPr lang="en-US" sz="1200" b="0" i="0" u="none" strike="noStrike" cap="none">
               <a:solidFill>
@@ -1783,11 +1569,11 @@
 </file>
 
 <file path=ppt/slideLayouts/slideLayout1.xml><?xml version="1.0" encoding="utf-8"?>
-<p:sldLayout xmlns:a="http://schemas.openxmlformats.org/drawingml/2006/main" xmlns:r="http://schemas.openxmlformats.org/officeDocument/2006/relationships" xmlns:p="http://schemas.openxmlformats.org/presentationml/2006/main" matchingName="Title Slide" type="title">
-  <p:cSld name="TITLE">
+<p:sldLayout xmlns:a="http://schemas.openxmlformats.org/drawingml/2006/main" xmlns:r="http://schemas.openxmlformats.org/officeDocument/2006/relationships" xmlns:p="http://schemas.openxmlformats.org/presentationml/2006/main" matchingName="Title and Content" type="obj">
+  <p:cSld name="OBJECT">
     <p:spTree>
       <p:nvGrpSpPr>
-        <p:cNvPr id="1" name="Shape 15"/>
+        <p:cNvPr id="1" name="Shape 21"/>
         <p:cNvGrpSpPr/>
         <p:nvPr/>
       </p:nvGrpSpPr>
@@ -1801,18 +1587,18 @@
       </p:grpSpPr>
       <p:sp>
         <p:nvSpPr>
-          <p:cNvPr id="16" name="Google Shape;16;p2"/>
+          <p:cNvPr id="22" name="Google Shape;22;p3"/>
           <p:cNvSpPr txBox="1">
             <a:spLocks noGrp="1"/>
           </p:cNvSpPr>
           <p:nvPr>
-            <p:ph type="ctrTitle"/>
+            <p:ph type="title"/>
           </p:nvPr>
         </p:nvSpPr>
         <p:spPr>
           <a:xfrm>
-            <a:off x="1143000" y="1122363"/>
-            <a:ext cx="6858000" cy="2387600"/>
+            <a:off x="628650" y="365126"/>
+            <a:ext cx="7886700" cy="1325563"/>
           </a:xfrm>
           <a:prstGeom prst="rect">
             <a:avLst/>
@@ -1823,11 +1609,11 @@
           </a:ln>
         </p:spPr>
         <p:txBody>
-          <a:bodyPr spcFirstLastPara="1" wrap="square" lIns="91425" tIns="45700" rIns="91425" bIns="45700" anchor="b" anchorCtr="0">
+          <a:bodyPr spcFirstLastPara="1" wrap="square" lIns="91425" tIns="45700" rIns="91425" bIns="45700" anchor="ctr" anchorCtr="0">
             <a:normAutofit/>
           </a:bodyPr>
           <a:lstStyle>
-            <a:lvl1pPr lvl="0" algn="ctr">
+            <a:lvl1pPr lvl="0" algn="l">
               <a:lnSpc>
                 <a:spcPct val="90000"/>
               </a:lnSpc>
@@ -1840,10 +1626,9 @@
               <a:buClr>
                 <a:schemeClr val="dk1"/>
               </a:buClr>
-              <a:buSzPts val="6000"/>
-              <a:buFont typeface="Calibri"/>
-              <a:buNone/>
-              <a:defRPr sz="4500"/>
+              <a:buSzPts val="1800"/>
+              <a:buNone/>
+              <a:defRPr/>
             </a:lvl1pPr>
             <a:lvl2pPr lvl="1">
               <a:spcBef>
@@ -1941,18 +1726,18 @@
       </p:sp>
       <p:sp>
         <p:nvSpPr>
-          <p:cNvPr id="17" name="Google Shape;17;p2"/>
+          <p:cNvPr id="23" name="Google Shape;23;p3"/>
           <p:cNvSpPr txBox="1">
             <a:spLocks noGrp="1"/>
           </p:cNvSpPr>
           <p:nvPr>
-            <p:ph type="subTitle" idx="1"/>
+            <p:ph type="body" idx="1"/>
           </p:nvPr>
         </p:nvSpPr>
         <p:spPr>
           <a:xfrm>
-            <a:off x="1143000" y="3602038"/>
-            <a:ext cx="6858000" cy="1655762"/>
+            <a:off x="628650" y="1825625"/>
+            <a:ext cx="7886700" cy="4351338"/>
           </a:xfrm>
           <a:prstGeom prst="rect">
             <a:avLst/>
@@ -1967,7 +1752,7 @@
             <a:normAutofit/>
           </a:bodyPr>
           <a:lstStyle>
-            <a:lvl1pPr lvl="0" algn="ctr">
+            <a:lvl1pPr marL="342900" lvl="0" indent="-257175" algn="l">
               <a:lnSpc>
                 <a:spcPct val="90000"/>
               </a:lnSpc>
@@ -1980,11 +1765,11 @@
               <a:buClr>
                 <a:schemeClr val="dk1"/>
               </a:buClr>
-              <a:buSzPts val="2400"/>
-              <a:buNone/>
-              <a:defRPr sz="1800"/>
+              <a:buSzPts val="1800"/>
+              <a:buChar char="•"/>
+              <a:defRPr/>
             </a:lvl1pPr>
-            <a:lvl2pPr lvl="1" algn="ctr">
+            <a:lvl2pPr marL="685800" lvl="1" indent="-257175" algn="l">
               <a:lnSpc>
                 <a:spcPct val="90000"/>
               </a:lnSpc>
@@ -1997,11 +1782,11 @@
               <a:buClr>
                 <a:schemeClr val="dk1"/>
               </a:buClr>
-              <a:buSzPts val="2000"/>
-              <a:buNone/>
-              <a:defRPr sz="1500"/>
+              <a:buSzPts val="1800"/>
+              <a:buChar char="•"/>
+              <a:defRPr/>
             </a:lvl2pPr>
-            <a:lvl3pPr lvl="2" algn="ctr">
+            <a:lvl3pPr marL="1028700" lvl="2" indent="-257175" algn="l">
               <a:lnSpc>
                 <a:spcPct val="90000"/>
               </a:lnSpc>
@@ -2015,10 +1800,10 @@
                 <a:schemeClr val="dk1"/>
               </a:buClr>
               <a:buSzPts val="1800"/>
-              <a:buNone/>
-              <a:defRPr sz="1350"/>
+              <a:buChar char="•"/>
+              <a:defRPr/>
             </a:lvl3pPr>
-            <a:lvl4pPr lvl="3" algn="ctr">
+            <a:lvl4pPr marL="1371600" lvl="3" indent="-257175" algn="l">
               <a:lnSpc>
                 <a:spcPct val="90000"/>
               </a:lnSpc>
@@ -2031,11 +1816,11 @@
               <a:buClr>
                 <a:schemeClr val="dk1"/>
               </a:buClr>
-              <a:buSzPts val="1600"/>
-              <a:buNone/>
-              <a:defRPr sz="1200"/>
+              <a:buSzPts val="1800"/>
+              <a:buChar char="•"/>
+              <a:defRPr/>
             </a:lvl4pPr>
-            <a:lvl5pPr lvl="4" algn="ctr">
+            <a:lvl5pPr marL="1714500" lvl="4" indent="-257175" algn="l">
               <a:lnSpc>
                 <a:spcPct val="90000"/>
               </a:lnSpc>
@@ -2048,11 +1833,11 @@
               <a:buClr>
                 <a:schemeClr val="dk1"/>
               </a:buClr>
-              <a:buSzPts val="1600"/>
-              <a:buNone/>
-              <a:defRPr sz="1200"/>
+              <a:buSzPts val="1800"/>
+              <a:buChar char="•"/>
+              <a:defRPr/>
             </a:lvl5pPr>
-            <a:lvl6pPr lvl="5" algn="ctr">
+            <a:lvl6pPr marL="2057400" lvl="5" indent="-257175" algn="l">
               <a:lnSpc>
                 <a:spcPct val="90000"/>
               </a:lnSpc>
@@ -2065,11 +1850,11 @@
               <a:buClr>
                 <a:schemeClr val="dk1"/>
               </a:buClr>
-              <a:buSzPts val="1600"/>
-              <a:buNone/>
-              <a:defRPr sz="1200"/>
+              <a:buSzPts val="1800"/>
+              <a:buChar char="•"/>
+              <a:defRPr/>
             </a:lvl6pPr>
-            <a:lvl7pPr lvl="6" algn="ctr">
+            <a:lvl7pPr marL="2400300" lvl="6" indent="-257175" algn="l">
               <a:lnSpc>
                 <a:spcPct val="90000"/>
               </a:lnSpc>
@@ -2082,11 +1867,11 @@
               <a:buClr>
                 <a:schemeClr val="dk1"/>
               </a:buClr>
-              <a:buSzPts val="1600"/>
-              <a:buNone/>
-              <a:defRPr sz="1200"/>
+              <a:buSzPts val="1800"/>
+              <a:buChar char="•"/>
+              <a:defRPr/>
             </a:lvl7pPr>
-            <a:lvl8pPr lvl="7" algn="ctr">
+            <a:lvl8pPr marL="2743200" lvl="7" indent="-257175" algn="l">
               <a:lnSpc>
                 <a:spcPct val="90000"/>
               </a:lnSpc>
@@ -2099,11 +1884,11 @@
               <a:buClr>
                 <a:schemeClr val="dk1"/>
               </a:buClr>
-              <a:buSzPts val="1600"/>
-              <a:buNone/>
-              <a:defRPr sz="1200"/>
+              <a:buSzPts val="1800"/>
+              <a:buChar char="•"/>
+              <a:defRPr/>
             </a:lvl8pPr>
-            <a:lvl9pPr lvl="8" algn="ctr">
+            <a:lvl9pPr marL="3086100" lvl="8" indent="-257175" algn="l">
               <a:lnSpc>
                 <a:spcPct val="90000"/>
               </a:lnSpc>
@@ -2116,9 +1901,9 @@
               <a:buClr>
                 <a:schemeClr val="dk1"/>
               </a:buClr>
-              <a:buSzPts val="1600"/>
-              <a:buNone/>
-              <a:defRPr sz="1200"/>
+              <a:buSzPts val="1800"/>
+              <a:buChar char="•"/>
+              <a:defRPr/>
             </a:lvl9pPr>
           </a:lstStyle>
           <a:p>
@@ -2128,7 +1913,7 @@
       </p:sp>
       <p:sp>
         <p:nvSpPr>
-          <p:cNvPr id="18" name="Google Shape;18;p2"/>
+          <p:cNvPr id="24" name="Google Shape;24;p3"/>
           <p:cNvSpPr txBox="1">
             <a:spLocks noGrp="1"/>
           </p:cNvSpPr>
@@ -2261,7 +2046,7 @@
       </p:sp>
       <p:sp>
         <p:nvSpPr>
-          <p:cNvPr id="19" name="Google Shape;19;p2"/>
+          <p:cNvPr id="25" name="Google Shape;25;p3"/>
           <p:cNvSpPr txBox="1">
             <a:spLocks noGrp="1"/>
           </p:cNvSpPr>
@@ -2394,7 +2179,7 @@
       </p:sp>
       <p:sp>
         <p:nvSpPr>
-          <p:cNvPr id="20" name="Google Shape;20;p2"/>
+          <p:cNvPr id="26" name="Google Shape;26;p3"/>
           <p:cNvSpPr txBox="1">
             <a:spLocks noGrp="1"/>
           </p:cNvSpPr>
@@ -2503,725 +2288,6 @@
 </file>
 
 <file path=ppt/slideLayouts/slideLayout10.xml><?xml version="1.0" encoding="utf-8"?>
-<p:sldLayout xmlns:a="http://schemas.openxmlformats.org/drawingml/2006/main" xmlns:r="http://schemas.openxmlformats.org/officeDocument/2006/relationships" xmlns:p="http://schemas.openxmlformats.org/presentationml/2006/main" matchingName="Title and Vertical Text" type="vertTx">
-  <p:cSld name="VERTICAL_TEXT">
-    <p:spTree>
-      <p:nvGrpSpPr>
-        <p:cNvPr id="1" name="Shape 72"/>
-        <p:cNvGrpSpPr/>
-        <p:nvPr/>
-      </p:nvGrpSpPr>
-      <p:grpSpPr>
-        <a:xfrm>
-          <a:off x="0" y="0"/>
-          <a:ext cx="0" cy="0"/>
-          <a:chOff x="0" y="0"/>
-          <a:chExt cx="0" cy="0"/>
-        </a:xfrm>
-      </p:grpSpPr>
-      <p:sp>
-        <p:nvSpPr>
-          <p:cNvPr id="73" name="Google Shape;73;p11"/>
-          <p:cNvSpPr txBox="1">
-            <a:spLocks noGrp="1"/>
-          </p:cNvSpPr>
-          <p:nvPr>
-            <p:ph type="title"/>
-          </p:nvPr>
-        </p:nvSpPr>
-        <p:spPr>
-          <a:xfrm>
-            <a:off x="628650" y="365126"/>
-            <a:ext cx="7886700" cy="1325563"/>
-          </a:xfrm>
-          <a:prstGeom prst="rect">
-            <a:avLst/>
-          </a:prstGeom>
-          <a:noFill/>
-          <a:ln>
-            <a:noFill/>
-          </a:ln>
-        </p:spPr>
-        <p:txBody>
-          <a:bodyPr spcFirstLastPara="1" wrap="square" lIns="91425" tIns="45700" rIns="91425" bIns="45700" anchor="ctr" anchorCtr="0">
-            <a:normAutofit/>
-          </a:bodyPr>
-          <a:lstStyle>
-            <a:lvl1pPr lvl="0" algn="l">
-              <a:lnSpc>
-                <a:spcPct val="90000"/>
-              </a:lnSpc>
-              <a:spcBef>
-                <a:spcPts val="0"/>
-              </a:spcBef>
-              <a:spcAft>
-                <a:spcPts val="0"/>
-              </a:spcAft>
-              <a:buClr>
-                <a:schemeClr val="dk1"/>
-              </a:buClr>
-              <a:buSzPts val="1800"/>
-              <a:buNone/>
-              <a:defRPr/>
-            </a:lvl1pPr>
-            <a:lvl2pPr lvl="1">
-              <a:spcBef>
-                <a:spcPts val="0"/>
-              </a:spcBef>
-              <a:spcAft>
-                <a:spcPts val="0"/>
-              </a:spcAft>
-              <a:buSzPts val="1400"/>
-              <a:buNone/>
-              <a:defRPr/>
-            </a:lvl2pPr>
-            <a:lvl3pPr lvl="2">
-              <a:spcBef>
-                <a:spcPts val="0"/>
-              </a:spcBef>
-              <a:spcAft>
-                <a:spcPts val="0"/>
-              </a:spcAft>
-              <a:buSzPts val="1400"/>
-              <a:buNone/>
-              <a:defRPr/>
-            </a:lvl3pPr>
-            <a:lvl4pPr lvl="3">
-              <a:spcBef>
-                <a:spcPts val="0"/>
-              </a:spcBef>
-              <a:spcAft>
-                <a:spcPts val="0"/>
-              </a:spcAft>
-              <a:buSzPts val="1400"/>
-              <a:buNone/>
-              <a:defRPr/>
-            </a:lvl4pPr>
-            <a:lvl5pPr lvl="4">
-              <a:spcBef>
-                <a:spcPts val="0"/>
-              </a:spcBef>
-              <a:spcAft>
-                <a:spcPts val="0"/>
-              </a:spcAft>
-              <a:buSzPts val="1400"/>
-              <a:buNone/>
-              <a:defRPr/>
-            </a:lvl5pPr>
-            <a:lvl6pPr lvl="5">
-              <a:spcBef>
-                <a:spcPts val="0"/>
-              </a:spcBef>
-              <a:spcAft>
-                <a:spcPts val="0"/>
-              </a:spcAft>
-              <a:buSzPts val="1400"/>
-              <a:buNone/>
-              <a:defRPr/>
-            </a:lvl6pPr>
-            <a:lvl7pPr lvl="6">
-              <a:spcBef>
-                <a:spcPts val="0"/>
-              </a:spcBef>
-              <a:spcAft>
-                <a:spcPts val="0"/>
-              </a:spcAft>
-              <a:buSzPts val="1400"/>
-              <a:buNone/>
-              <a:defRPr/>
-            </a:lvl7pPr>
-            <a:lvl8pPr lvl="7">
-              <a:spcBef>
-                <a:spcPts val="0"/>
-              </a:spcBef>
-              <a:spcAft>
-                <a:spcPts val="0"/>
-              </a:spcAft>
-              <a:buSzPts val="1400"/>
-              <a:buNone/>
-              <a:defRPr/>
-            </a:lvl8pPr>
-            <a:lvl9pPr lvl="8">
-              <a:spcBef>
-                <a:spcPts val="0"/>
-              </a:spcBef>
-              <a:spcAft>
-                <a:spcPts val="0"/>
-              </a:spcAft>
-              <a:buSzPts val="1400"/>
-              <a:buNone/>
-              <a:defRPr/>
-            </a:lvl9pPr>
-          </a:lstStyle>
-          <a:p>
-            <a:endParaRPr/>
-          </a:p>
-        </p:txBody>
-      </p:sp>
-      <p:sp>
-        <p:nvSpPr>
-          <p:cNvPr id="74" name="Google Shape;74;p11"/>
-          <p:cNvSpPr txBox="1">
-            <a:spLocks noGrp="1"/>
-          </p:cNvSpPr>
-          <p:nvPr>
-            <p:ph type="body" idx="1"/>
-          </p:nvPr>
-        </p:nvSpPr>
-        <p:spPr>
-          <a:xfrm rot="5400000">
-            <a:off x="2396331" y="57944"/>
-            <a:ext cx="4351338" cy="7886700"/>
-          </a:xfrm>
-          <a:prstGeom prst="rect">
-            <a:avLst/>
-          </a:prstGeom>
-          <a:noFill/>
-          <a:ln>
-            <a:noFill/>
-          </a:ln>
-        </p:spPr>
-        <p:txBody>
-          <a:bodyPr spcFirstLastPara="1" wrap="square" lIns="91425" tIns="45700" rIns="91425" bIns="45700" anchor="t" anchorCtr="0">
-            <a:normAutofit/>
-          </a:bodyPr>
-          <a:lstStyle>
-            <a:lvl1pPr marL="342900" lvl="0" indent="-257175" algn="l">
-              <a:lnSpc>
-                <a:spcPct val="90000"/>
-              </a:lnSpc>
-              <a:spcBef>
-                <a:spcPts val="750"/>
-              </a:spcBef>
-              <a:spcAft>
-                <a:spcPts val="0"/>
-              </a:spcAft>
-              <a:buClr>
-                <a:schemeClr val="dk1"/>
-              </a:buClr>
-              <a:buSzPts val="1800"/>
-              <a:buChar char="•"/>
-              <a:defRPr/>
-            </a:lvl1pPr>
-            <a:lvl2pPr marL="685800" lvl="1" indent="-257175" algn="l">
-              <a:lnSpc>
-                <a:spcPct val="90000"/>
-              </a:lnSpc>
-              <a:spcBef>
-                <a:spcPts val="375"/>
-              </a:spcBef>
-              <a:spcAft>
-                <a:spcPts val="0"/>
-              </a:spcAft>
-              <a:buClr>
-                <a:schemeClr val="dk1"/>
-              </a:buClr>
-              <a:buSzPts val="1800"/>
-              <a:buChar char="•"/>
-              <a:defRPr/>
-            </a:lvl2pPr>
-            <a:lvl3pPr marL="1028700" lvl="2" indent="-257175" algn="l">
-              <a:lnSpc>
-                <a:spcPct val="90000"/>
-              </a:lnSpc>
-              <a:spcBef>
-                <a:spcPts val="375"/>
-              </a:spcBef>
-              <a:spcAft>
-                <a:spcPts val="0"/>
-              </a:spcAft>
-              <a:buClr>
-                <a:schemeClr val="dk1"/>
-              </a:buClr>
-              <a:buSzPts val="1800"/>
-              <a:buChar char="•"/>
-              <a:defRPr/>
-            </a:lvl3pPr>
-            <a:lvl4pPr marL="1371600" lvl="3" indent="-257175" algn="l">
-              <a:lnSpc>
-                <a:spcPct val="90000"/>
-              </a:lnSpc>
-              <a:spcBef>
-                <a:spcPts val="375"/>
-              </a:spcBef>
-              <a:spcAft>
-                <a:spcPts val="0"/>
-              </a:spcAft>
-              <a:buClr>
-                <a:schemeClr val="dk1"/>
-              </a:buClr>
-              <a:buSzPts val="1800"/>
-              <a:buChar char="•"/>
-              <a:defRPr/>
-            </a:lvl4pPr>
-            <a:lvl5pPr marL="1714500" lvl="4" indent="-257175" algn="l">
-              <a:lnSpc>
-                <a:spcPct val="90000"/>
-              </a:lnSpc>
-              <a:spcBef>
-                <a:spcPts val="375"/>
-              </a:spcBef>
-              <a:spcAft>
-                <a:spcPts val="0"/>
-              </a:spcAft>
-              <a:buClr>
-                <a:schemeClr val="dk1"/>
-              </a:buClr>
-              <a:buSzPts val="1800"/>
-              <a:buChar char="•"/>
-              <a:defRPr/>
-            </a:lvl5pPr>
-            <a:lvl6pPr marL="2057400" lvl="5" indent="-257175" algn="l">
-              <a:lnSpc>
-                <a:spcPct val="90000"/>
-              </a:lnSpc>
-              <a:spcBef>
-                <a:spcPts val="375"/>
-              </a:spcBef>
-              <a:spcAft>
-                <a:spcPts val="0"/>
-              </a:spcAft>
-              <a:buClr>
-                <a:schemeClr val="dk1"/>
-              </a:buClr>
-              <a:buSzPts val="1800"/>
-              <a:buChar char="•"/>
-              <a:defRPr/>
-            </a:lvl6pPr>
-            <a:lvl7pPr marL="2400300" lvl="6" indent="-257175" algn="l">
-              <a:lnSpc>
-                <a:spcPct val="90000"/>
-              </a:lnSpc>
-              <a:spcBef>
-                <a:spcPts val="375"/>
-              </a:spcBef>
-              <a:spcAft>
-                <a:spcPts val="0"/>
-              </a:spcAft>
-              <a:buClr>
-                <a:schemeClr val="dk1"/>
-              </a:buClr>
-              <a:buSzPts val="1800"/>
-              <a:buChar char="•"/>
-              <a:defRPr/>
-            </a:lvl7pPr>
-            <a:lvl8pPr marL="2743200" lvl="7" indent="-257175" algn="l">
-              <a:lnSpc>
-                <a:spcPct val="90000"/>
-              </a:lnSpc>
-              <a:spcBef>
-                <a:spcPts val="375"/>
-              </a:spcBef>
-              <a:spcAft>
-                <a:spcPts val="0"/>
-              </a:spcAft>
-              <a:buClr>
-                <a:schemeClr val="dk1"/>
-              </a:buClr>
-              <a:buSzPts val="1800"/>
-              <a:buChar char="•"/>
-              <a:defRPr/>
-            </a:lvl8pPr>
-            <a:lvl9pPr marL="3086100" lvl="8" indent="-257175" algn="l">
-              <a:lnSpc>
-                <a:spcPct val="90000"/>
-              </a:lnSpc>
-              <a:spcBef>
-                <a:spcPts val="375"/>
-              </a:spcBef>
-              <a:spcAft>
-                <a:spcPts val="0"/>
-              </a:spcAft>
-              <a:buClr>
-                <a:schemeClr val="dk1"/>
-              </a:buClr>
-              <a:buSzPts val="1800"/>
-              <a:buChar char="•"/>
-              <a:defRPr/>
-            </a:lvl9pPr>
-          </a:lstStyle>
-          <a:p>
-            <a:endParaRPr/>
-          </a:p>
-        </p:txBody>
-      </p:sp>
-      <p:sp>
-        <p:nvSpPr>
-          <p:cNvPr id="75" name="Google Shape;75;p11"/>
-          <p:cNvSpPr txBox="1">
-            <a:spLocks noGrp="1"/>
-          </p:cNvSpPr>
-          <p:nvPr>
-            <p:ph type="dt" idx="10"/>
-          </p:nvPr>
-        </p:nvSpPr>
-        <p:spPr>
-          <a:xfrm>
-            <a:off x="628650" y="6356351"/>
-            <a:ext cx="2057400" cy="365125"/>
-          </a:xfrm>
-          <a:prstGeom prst="rect">
-            <a:avLst/>
-          </a:prstGeom>
-          <a:noFill/>
-          <a:ln>
-            <a:noFill/>
-          </a:ln>
-        </p:spPr>
-        <p:txBody>
-          <a:bodyPr spcFirstLastPara="1" wrap="square" lIns="91425" tIns="45700" rIns="91425" bIns="45700" anchor="ctr" anchorCtr="0">
-            <a:noAutofit/>
-          </a:bodyPr>
-          <a:lstStyle>
-            <a:lvl1pPr lvl="0" algn="l">
-              <a:spcBef>
-                <a:spcPts val="0"/>
-              </a:spcBef>
-              <a:spcAft>
-                <a:spcPts val="0"/>
-              </a:spcAft>
-              <a:buSzPts val="1400"/>
-              <a:buNone/>
-              <a:defRPr/>
-            </a:lvl1pPr>
-            <a:lvl2pPr lvl="1" algn="l">
-              <a:spcBef>
-                <a:spcPts val="0"/>
-              </a:spcBef>
-              <a:spcAft>
-                <a:spcPts val="0"/>
-              </a:spcAft>
-              <a:buSzPts val="1400"/>
-              <a:buNone/>
-              <a:defRPr/>
-            </a:lvl2pPr>
-            <a:lvl3pPr lvl="2" algn="l">
-              <a:spcBef>
-                <a:spcPts val="0"/>
-              </a:spcBef>
-              <a:spcAft>
-                <a:spcPts val="0"/>
-              </a:spcAft>
-              <a:buSzPts val="1400"/>
-              <a:buNone/>
-              <a:defRPr/>
-            </a:lvl3pPr>
-            <a:lvl4pPr lvl="3" algn="l">
-              <a:spcBef>
-                <a:spcPts val="0"/>
-              </a:spcBef>
-              <a:spcAft>
-                <a:spcPts val="0"/>
-              </a:spcAft>
-              <a:buSzPts val="1400"/>
-              <a:buNone/>
-              <a:defRPr/>
-            </a:lvl4pPr>
-            <a:lvl5pPr lvl="4" algn="l">
-              <a:spcBef>
-                <a:spcPts val="0"/>
-              </a:spcBef>
-              <a:spcAft>
-                <a:spcPts val="0"/>
-              </a:spcAft>
-              <a:buSzPts val="1400"/>
-              <a:buNone/>
-              <a:defRPr/>
-            </a:lvl5pPr>
-            <a:lvl6pPr lvl="5" algn="l">
-              <a:spcBef>
-                <a:spcPts val="0"/>
-              </a:spcBef>
-              <a:spcAft>
-                <a:spcPts val="0"/>
-              </a:spcAft>
-              <a:buSzPts val="1400"/>
-              <a:buNone/>
-              <a:defRPr/>
-            </a:lvl6pPr>
-            <a:lvl7pPr lvl="6" algn="l">
-              <a:spcBef>
-                <a:spcPts val="0"/>
-              </a:spcBef>
-              <a:spcAft>
-                <a:spcPts val="0"/>
-              </a:spcAft>
-              <a:buSzPts val="1400"/>
-              <a:buNone/>
-              <a:defRPr/>
-            </a:lvl7pPr>
-            <a:lvl8pPr lvl="7" algn="l">
-              <a:spcBef>
-                <a:spcPts val="0"/>
-              </a:spcBef>
-              <a:spcAft>
-                <a:spcPts val="0"/>
-              </a:spcAft>
-              <a:buSzPts val="1400"/>
-              <a:buNone/>
-              <a:defRPr/>
-            </a:lvl8pPr>
-            <a:lvl9pPr lvl="8" algn="l">
-              <a:spcBef>
-                <a:spcPts val="0"/>
-              </a:spcBef>
-              <a:spcAft>
-                <a:spcPts val="0"/>
-              </a:spcAft>
-              <a:buSzPts val="1400"/>
-              <a:buNone/>
-              <a:defRPr/>
-            </a:lvl9pPr>
-          </a:lstStyle>
-          <a:p>
-            <a:endParaRPr/>
-          </a:p>
-        </p:txBody>
-      </p:sp>
-      <p:sp>
-        <p:nvSpPr>
-          <p:cNvPr id="76" name="Google Shape;76;p11"/>
-          <p:cNvSpPr txBox="1">
-            <a:spLocks noGrp="1"/>
-          </p:cNvSpPr>
-          <p:nvPr>
-            <p:ph type="ftr" idx="11"/>
-          </p:nvPr>
-        </p:nvSpPr>
-        <p:spPr>
-          <a:xfrm>
-            <a:off x="3028950" y="6356351"/>
-            <a:ext cx="3086100" cy="365125"/>
-          </a:xfrm>
-          <a:prstGeom prst="rect">
-            <a:avLst/>
-          </a:prstGeom>
-          <a:noFill/>
-          <a:ln>
-            <a:noFill/>
-          </a:ln>
-        </p:spPr>
-        <p:txBody>
-          <a:bodyPr spcFirstLastPara="1" wrap="square" lIns="91425" tIns="45700" rIns="91425" bIns="45700" anchor="ctr" anchorCtr="0">
-            <a:noAutofit/>
-          </a:bodyPr>
-          <a:lstStyle>
-            <a:lvl1pPr lvl="0" algn="ctr">
-              <a:spcBef>
-                <a:spcPts val="0"/>
-              </a:spcBef>
-              <a:spcAft>
-                <a:spcPts val="0"/>
-              </a:spcAft>
-              <a:buSzPts val="1400"/>
-              <a:buNone/>
-              <a:defRPr/>
-            </a:lvl1pPr>
-            <a:lvl2pPr lvl="1" algn="l">
-              <a:spcBef>
-                <a:spcPts val="0"/>
-              </a:spcBef>
-              <a:spcAft>
-                <a:spcPts val="0"/>
-              </a:spcAft>
-              <a:buSzPts val="1400"/>
-              <a:buNone/>
-              <a:defRPr/>
-            </a:lvl2pPr>
-            <a:lvl3pPr lvl="2" algn="l">
-              <a:spcBef>
-                <a:spcPts val="0"/>
-              </a:spcBef>
-              <a:spcAft>
-                <a:spcPts val="0"/>
-              </a:spcAft>
-              <a:buSzPts val="1400"/>
-              <a:buNone/>
-              <a:defRPr/>
-            </a:lvl3pPr>
-            <a:lvl4pPr lvl="3" algn="l">
-              <a:spcBef>
-                <a:spcPts val="0"/>
-              </a:spcBef>
-              <a:spcAft>
-                <a:spcPts val="0"/>
-              </a:spcAft>
-              <a:buSzPts val="1400"/>
-              <a:buNone/>
-              <a:defRPr/>
-            </a:lvl4pPr>
-            <a:lvl5pPr lvl="4" algn="l">
-              <a:spcBef>
-                <a:spcPts val="0"/>
-              </a:spcBef>
-              <a:spcAft>
-                <a:spcPts val="0"/>
-              </a:spcAft>
-              <a:buSzPts val="1400"/>
-              <a:buNone/>
-              <a:defRPr/>
-            </a:lvl5pPr>
-            <a:lvl6pPr lvl="5" algn="l">
-              <a:spcBef>
-                <a:spcPts val="0"/>
-              </a:spcBef>
-              <a:spcAft>
-                <a:spcPts val="0"/>
-              </a:spcAft>
-              <a:buSzPts val="1400"/>
-              <a:buNone/>
-              <a:defRPr/>
-            </a:lvl6pPr>
-            <a:lvl7pPr lvl="6" algn="l">
-              <a:spcBef>
-                <a:spcPts val="0"/>
-              </a:spcBef>
-              <a:spcAft>
-                <a:spcPts val="0"/>
-              </a:spcAft>
-              <a:buSzPts val="1400"/>
-              <a:buNone/>
-              <a:defRPr/>
-            </a:lvl7pPr>
-            <a:lvl8pPr lvl="7" algn="l">
-              <a:spcBef>
-                <a:spcPts val="0"/>
-              </a:spcBef>
-              <a:spcAft>
-                <a:spcPts val="0"/>
-              </a:spcAft>
-              <a:buSzPts val="1400"/>
-              <a:buNone/>
-              <a:defRPr/>
-            </a:lvl8pPr>
-            <a:lvl9pPr lvl="8" algn="l">
-              <a:spcBef>
-                <a:spcPts val="0"/>
-              </a:spcBef>
-              <a:spcAft>
-                <a:spcPts val="0"/>
-              </a:spcAft>
-              <a:buSzPts val="1400"/>
-              <a:buNone/>
-              <a:defRPr/>
-            </a:lvl9pPr>
-          </a:lstStyle>
-          <a:p>
-            <a:endParaRPr/>
-          </a:p>
-        </p:txBody>
-      </p:sp>
-      <p:sp>
-        <p:nvSpPr>
-          <p:cNvPr id="77" name="Google Shape;77;p11"/>
-          <p:cNvSpPr txBox="1">
-            <a:spLocks noGrp="1"/>
-          </p:cNvSpPr>
-          <p:nvPr>
-            <p:ph type="sldNum" idx="12"/>
-          </p:nvPr>
-        </p:nvSpPr>
-        <p:spPr>
-          <a:xfrm>
-            <a:off x="6457950" y="6356351"/>
-            <a:ext cx="2057400" cy="365125"/>
-          </a:xfrm>
-          <a:prstGeom prst="rect">
-            <a:avLst/>
-          </a:prstGeom>
-          <a:noFill/>
-          <a:ln>
-            <a:noFill/>
-          </a:ln>
-        </p:spPr>
-        <p:txBody>
-          <a:bodyPr spcFirstLastPara="1" wrap="square" lIns="91425" tIns="45700" rIns="91425" bIns="45700" anchor="ctr" anchorCtr="0">
-            <a:noAutofit/>
-          </a:bodyPr>
-          <a:lstStyle>
-            <a:lvl1pPr marL="0" lvl="0" indent="0" algn="r">
-              <a:spcBef>
-                <a:spcPts val="0"/>
-              </a:spcBef>
-              <a:buNone/>
-              <a:defRPr/>
-            </a:lvl1pPr>
-            <a:lvl2pPr marL="0" lvl="1" indent="0" algn="r">
-              <a:spcBef>
-                <a:spcPts val="0"/>
-              </a:spcBef>
-              <a:buNone/>
-              <a:defRPr/>
-            </a:lvl2pPr>
-            <a:lvl3pPr marL="0" lvl="2" indent="0" algn="r">
-              <a:spcBef>
-                <a:spcPts val="0"/>
-              </a:spcBef>
-              <a:buNone/>
-              <a:defRPr/>
-            </a:lvl3pPr>
-            <a:lvl4pPr marL="0" lvl="3" indent="0" algn="r">
-              <a:spcBef>
-                <a:spcPts val="0"/>
-              </a:spcBef>
-              <a:buNone/>
-              <a:defRPr/>
-            </a:lvl4pPr>
-            <a:lvl5pPr marL="0" lvl="4" indent="0" algn="r">
-              <a:spcBef>
-                <a:spcPts val="0"/>
-              </a:spcBef>
-              <a:buNone/>
-              <a:defRPr/>
-            </a:lvl5pPr>
-            <a:lvl6pPr marL="0" lvl="5" indent="0" algn="r">
-              <a:spcBef>
-                <a:spcPts val="0"/>
-              </a:spcBef>
-              <a:buNone/>
-              <a:defRPr/>
-            </a:lvl6pPr>
-            <a:lvl7pPr marL="0" lvl="6" indent="0" algn="r">
-              <a:spcBef>
-                <a:spcPts val="0"/>
-              </a:spcBef>
-              <a:buNone/>
-              <a:defRPr/>
-            </a:lvl7pPr>
-            <a:lvl8pPr marL="0" lvl="7" indent="0" algn="r">
-              <a:spcBef>
-                <a:spcPts val="0"/>
-              </a:spcBef>
-              <a:buNone/>
-              <a:defRPr/>
-            </a:lvl8pPr>
-            <a:lvl9pPr marL="0" lvl="8" indent="0" algn="r">
-              <a:spcBef>
-                <a:spcPts val="0"/>
-              </a:spcBef>
-              <a:buNone/>
-              <a:defRPr/>
-            </a:lvl9pPr>
-          </a:lstStyle>
-          <a:p>
-            <a:fld id="{00000000-1234-1234-1234-123412341234}" type="slidenum">
-              <a:rPr lang="en-US" smtClean="0"/>
-              <a:pPr/>
-              <a:t>‹#›</a:t>
-            </a:fld>
-            <a:endParaRPr lang="en-US"/>
-          </a:p>
-        </p:txBody>
-      </p:sp>
-    </p:spTree>
-  </p:cSld>
-  <p:clrMapOvr>
-    <a:masterClrMapping/>
-  </p:clrMapOvr>
-</p:sldLayout>
-</file>
-
-<file path=ppt/slideLayouts/slideLayout11.xml><?xml version="1.0" encoding="utf-8"?>
 <p:sldLayout xmlns:a="http://schemas.openxmlformats.org/drawingml/2006/main" xmlns:r="http://schemas.openxmlformats.org/officeDocument/2006/relationships" xmlns:p="http://schemas.openxmlformats.org/presentationml/2006/main" matchingName="Vertical Title and Text" type="vertTitleAndTx">
   <p:cSld name="VERTICAL_TITLE_AND_VERTICAL_TEXT">
     <p:spTree>
@@ -3941,725 +3007,6 @@
 </file>
 
 <file path=ppt/slideLayouts/slideLayout2.xml><?xml version="1.0" encoding="utf-8"?>
-<p:sldLayout xmlns:a="http://schemas.openxmlformats.org/drawingml/2006/main" xmlns:r="http://schemas.openxmlformats.org/officeDocument/2006/relationships" xmlns:p="http://schemas.openxmlformats.org/presentationml/2006/main" matchingName="Title and Content" type="obj">
-  <p:cSld name="OBJECT">
-    <p:spTree>
-      <p:nvGrpSpPr>
-        <p:cNvPr id="1" name="Shape 21"/>
-        <p:cNvGrpSpPr/>
-        <p:nvPr/>
-      </p:nvGrpSpPr>
-      <p:grpSpPr>
-        <a:xfrm>
-          <a:off x="0" y="0"/>
-          <a:ext cx="0" cy="0"/>
-          <a:chOff x="0" y="0"/>
-          <a:chExt cx="0" cy="0"/>
-        </a:xfrm>
-      </p:grpSpPr>
-      <p:sp>
-        <p:nvSpPr>
-          <p:cNvPr id="22" name="Google Shape;22;p3"/>
-          <p:cNvSpPr txBox="1">
-            <a:spLocks noGrp="1"/>
-          </p:cNvSpPr>
-          <p:nvPr>
-            <p:ph type="title"/>
-          </p:nvPr>
-        </p:nvSpPr>
-        <p:spPr>
-          <a:xfrm>
-            <a:off x="628650" y="365126"/>
-            <a:ext cx="7886700" cy="1325563"/>
-          </a:xfrm>
-          <a:prstGeom prst="rect">
-            <a:avLst/>
-          </a:prstGeom>
-          <a:noFill/>
-          <a:ln>
-            <a:noFill/>
-          </a:ln>
-        </p:spPr>
-        <p:txBody>
-          <a:bodyPr spcFirstLastPara="1" wrap="square" lIns="91425" tIns="45700" rIns="91425" bIns="45700" anchor="ctr" anchorCtr="0">
-            <a:normAutofit/>
-          </a:bodyPr>
-          <a:lstStyle>
-            <a:lvl1pPr lvl="0" algn="l">
-              <a:lnSpc>
-                <a:spcPct val="90000"/>
-              </a:lnSpc>
-              <a:spcBef>
-                <a:spcPts val="0"/>
-              </a:spcBef>
-              <a:spcAft>
-                <a:spcPts val="0"/>
-              </a:spcAft>
-              <a:buClr>
-                <a:schemeClr val="dk1"/>
-              </a:buClr>
-              <a:buSzPts val="1800"/>
-              <a:buNone/>
-              <a:defRPr/>
-            </a:lvl1pPr>
-            <a:lvl2pPr lvl="1">
-              <a:spcBef>
-                <a:spcPts val="0"/>
-              </a:spcBef>
-              <a:spcAft>
-                <a:spcPts val="0"/>
-              </a:spcAft>
-              <a:buSzPts val="1400"/>
-              <a:buNone/>
-              <a:defRPr/>
-            </a:lvl2pPr>
-            <a:lvl3pPr lvl="2">
-              <a:spcBef>
-                <a:spcPts val="0"/>
-              </a:spcBef>
-              <a:spcAft>
-                <a:spcPts val="0"/>
-              </a:spcAft>
-              <a:buSzPts val="1400"/>
-              <a:buNone/>
-              <a:defRPr/>
-            </a:lvl3pPr>
-            <a:lvl4pPr lvl="3">
-              <a:spcBef>
-                <a:spcPts val="0"/>
-              </a:spcBef>
-              <a:spcAft>
-                <a:spcPts val="0"/>
-              </a:spcAft>
-              <a:buSzPts val="1400"/>
-              <a:buNone/>
-              <a:defRPr/>
-            </a:lvl4pPr>
-            <a:lvl5pPr lvl="4">
-              <a:spcBef>
-                <a:spcPts val="0"/>
-              </a:spcBef>
-              <a:spcAft>
-                <a:spcPts val="0"/>
-              </a:spcAft>
-              <a:buSzPts val="1400"/>
-              <a:buNone/>
-              <a:defRPr/>
-            </a:lvl5pPr>
-            <a:lvl6pPr lvl="5">
-              <a:spcBef>
-                <a:spcPts val="0"/>
-              </a:spcBef>
-              <a:spcAft>
-                <a:spcPts val="0"/>
-              </a:spcAft>
-              <a:buSzPts val="1400"/>
-              <a:buNone/>
-              <a:defRPr/>
-            </a:lvl6pPr>
-            <a:lvl7pPr lvl="6">
-              <a:spcBef>
-                <a:spcPts val="0"/>
-              </a:spcBef>
-              <a:spcAft>
-                <a:spcPts val="0"/>
-              </a:spcAft>
-              <a:buSzPts val="1400"/>
-              <a:buNone/>
-              <a:defRPr/>
-            </a:lvl7pPr>
-            <a:lvl8pPr lvl="7">
-              <a:spcBef>
-                <a:spcPts val="0"/>
-              </a:spcBef>
-              <a:spcAft>
-                <a:spcPts val="0"/>
-              </a:spcAft>
-              <a:buSzPts val="1400"/>
-              <a:buNone/>
-              <a:defRPr/>
-            </a:lvl8pPr>
-            <a:lvl9pPr lvl="8">
-              <a:spcBef>
-                <a:spcPts val="0"/>
-              </a:spcBef>
-              <a:spcAft>
-                <a:spcPts val="0"/>
-              </a:spcAft>
-              <a:buSzPts val="1400"/>
-              <a:buNone/>
-              <a:defRPr/>
-            </a:lvl9pPr>
-          </a:lstStyle>
-          <a:p>
-            <a:endParaRPr/>
-          </a:p>
-        </p:txBody>
-      </p:sp>
-      <p:sp>
-        <p:nvSpPr>
-          <p:cNvPr id="23" name="Google Shape;23;p3"/>
-          <p:cNvSpPr txBox="1">
-            <a:spLocks noGrp="1"/>
-          </p:cNvSpPr>
-          <p:nvPr>
-            <p:ph type="body" idx="1"/>
-          </p:nvPr>
-        </p:nvSpPr>
-        <p:spPr>
-          <a:xfrm>
-            <a:off x="628650" y="1825625"/>
-            <a:ext cx="7886700" cy="4351338"/>
-          </a:xfrm>
-          <a:prstGeom prst="rect">
-            <a:avLst/>
-          </a:prstGeom>
-          <a:noFill/>
-          <a:ln>
-            <a:noFill/>
-          </a:ln>
-        </p:spPr>
-        <p:txBody>
-          <a:bodyPr spcFirstLastPara="1" wrap="square" lIns="91425" tIns="45700" rIns="91425" bIns="45700" anchor="t" anchorCtr="0">
-            <a:normAutofit/>
-          </a:bodyPr>
-          <a:lstStyle>
-            <a:lvl1pPr marL="342900" lvl="0" indent="-257175" algn="l">
-              <a:lnSpc>
-                <a:spcPct val="90000"/>
-              </a:lnSpc>
-              <a:spcBef>
-                <a:spcPts val="750"/>
-              </a:spcBef>
-              <a:spcAft>
-                <a:spcPts val="0"/>
-              </a:spcAft>
-              <a:buClr>
-                <a:schemeClr val="dk1"/>
-              </a:buClr>
-              <a:buSzPts val="1800"/>
-              <a:buChar char="•"/>
-              <a:defRPr/>
-            </a:lvl1pPr>
-            <a:lvl2pPr marL="685800" lvl="1" indent="-257175" algn="l">
-              <a:lnSpc>
-                <a:spcPct val="90000"/>
-              </a:lnSpc>
-              <a:spcBef>
-                <a:spcPts val="375"/>
-              </a:spcBef>
-              <a:spcAft>
-                <a:spcPts val="0"/>
-              </a:spcAft>
-              <a:buClr>
-                <a:schemeClr val="dk1"/>
-              </a:buClr>
-              <a:buSzPts val="1800"/>
-              <a:buChar char="•"/>
-              <a:defRPr/>
-            </a:lvl2pPr>
-            <a:lvl3pPr marL="1028700" lvl="2" indent="-257175" algn="l">
-              <a:lnSpc>
-                <a:spcPct val="90000"/>
-              </a:lnSpc>
-              <a:spcBef>
-                <a:spcPts val="375"/>
-              </a:spcBef>
-              <a:spcAft>
-                <a:spcPts val="0"/>
-              </a:spcAft>
-              <a:buClr>
-                <a:schemeClr val="dk1"/>
-              </a:buClr>
-              <a:buSzPts val="1800"/>
-              <a:buChar char="•"/>
-              <a:defRPr/>
-            </a:lvl3pPr>
-            <a:lvl4pPr marL="1371600" lvl="3" indent="-257175" algn="l">
-              <a:lnSpc>
-                <a:spcPct val="90000"/>
-              </a:lnSpc>
-              <a:spcBef>
-                <a:spcPts val="375"/>
-              </a:spcBef>
-              <a:spcAft>
-                <a:spcPts val="0"/>
-              </a:spcAft>
-              <a:buClr>
-                <a:schemeClr val="dk1"/>
-              </a:buClr>
-              <a:buSzPts val="1800"/>
-              <a:buChar char="•"/>
-              <a:defRPr/>
-            </a:lvl4pPr>
-            <a:lvl5pPr marL="1714500" lvl="4" indent="-257175" algn="l">
-              <a:lnSpc>
-                <a:spcPct val="90000"/>
-              </a:lnSpc>
-              <a:spcBef>
-                <a:spcPts val="375"/>
-              </a:spcBef>
-              <a:spcAft>
-                <a:spcPts val="0"/>
-              </a:spcAft>
-              <a:buClr>
-                <a:schemeClr val="dk1"/>
-              </a:buClr>
-              <a:buSzPts val="1800"/>
-              <a:buChar char="•"/>
-              <a:defRPr/>
-            </a:lvl5pPr>
-            <a:lvl6pPr marL="2057400" lvl="5" indent="-257175" algn="l">
-              <a:lnSpc>
-                <a:spcPct val="90000"/>
-              </a:lnSpc>
-              <a:spcBef>
-                <a:spcPts val="375"/>
-              </a:spcBef>
-              <a:spcAft>
-                <a:spcPts val="0"/>
-              </a:spcAft>
-              <a:buClr>
-                <a:schemeClr val="dk1"/>
-              </a:buClr>
-              <a:buSzPts val="1800"/>
-              <a:buChar char="•"/>
-              <a:defRPr/>
-            </a:lvl6pPr>
-            <a:lvl7pPr marL="2400300" lvl="6" indent="-257175" algn="l">
-              <a:lnSpc>
-                <a:spcPct val="90000"/>
-              </a:lnSpc>
-              <a:spcBef>
-                <a:spcPts val="375"/>
-              </a:spcBef>
-              <a:spcAft>
-                <a:spcPts val="0"/>
-              </a:spcAft>
-              <a:buClr>
-                <a:schemeClr val="dk1"/>
-              </a:buClr>
-              <a:buSzPts val="1800"/>
-              <a:buChar char="•"/>
-              <a:defRPr/>
-            </a:lvl7pPr>
-            <a:lvl8pPr marL="2743200" lvl="7" indent="-257175" algn="l">
-              <a:lnSpc>
-                <a:spcPct val="90000"/>
-              </a:lnSpc>
-              <a:spcBef>
-                <a:spcPts val="375"/>
-              </a:spcBef>
-              <a:spcAft>
-                <a:spcPts val="0"/>
-              </a:spcAft>
-              <a:buClr>
-                <a:schemeClr val="dk1"/>
-              </a:buClr>
-              <a:buSzPts val="1800"/>
-              <a:buChar char="•"/>
-              <a:defRPr/>
-            </a:lvl8pPr>
-            <a:lvl9pPr marL="3086100" lvl="8" indent="-257175" algn="l">
-              <a:lnSpc>
-                <a:spcPct val="90000"/>
-              </a:lnSpc>
-              <a:spcBef>
-                <a:spcPts val="375"/>
-              </a:spcBef>
-              <a:spcAft>
-                <a:spcPts val="0"/>
-              </a:spcAft>
-              <a:buClr>
-                <a:schemeClr val="dk1"/>
-              </a:buClr>
-              <a:buSzPts val="1800"/>
-              <a:buChar char="•"/>
-              <a:defRPr/>
-            </a:lvl9pPr>
-          </a:lstStyle>
-          <a:p>
-            <a:endParaRPr/>
-          </a:p>
-        </p:txBody>
-      </p:sp>
-      <p:sp>
-        <p:nvSpPr>
-          <p:cNvPr id="24" name="Google Shape;24;p3"/>
-          <p:cNvSpPr txBox="1">
-            <a:spLocks noGrp="1"/>
-          </p:cNvSpPr>
-          <p:nvPr>
-            <p:ph type="dt" idx="10"/>
-          </p:nvPr>
-        </p:nvSpPr>
-        <p:spPr>
-          <a:xfrm>
-            <a:off x="628650" y="6356351"/>
-            <a:ext cx="2057400" cy="365125"/>
-          </a:xfrm>
-          <a:prstGeom prst="rect">
-            <a:avLst/>
-          </a:prstGeom>
-          <a:noFill/>
-          <a:ln>
-            <a:noFill/>
-          </a:ln>
-        </p:spPr>
-        <p:txBody>
-          <a:bodyPr spcFirstLastPara="1" wrap="square" lIns="91425" tIns="45700" rIns="91425" bIns="45700" anchor="ctr" anchorCtr="0">
-            <a:noAutofit/>
-          </a:bodyPr>
-          <a:lstStyle>
-            <a:lvl1pPr lvl="0" algn="l">
-              <a:spcBef>
-                <a:spcPts val="0"/>
-              </a:spcBef>
-              <a:spcAft>
-                <a:spcPts val="0"/>
-              </a:spcAft>
-              <a:buSzPts val="1400"/>
-              <a:buNone/>
-              <a:defRPr/>
-            </a:lvl1pPr>
-            <a:lvl2pPr lvl="1" algn="l">
-              <a:spcBef>
-                <a:spcPts val="0"/>
-              </a:spcBef>
-              <a:spcAft>
-                <a:spcPts val="0"/>
-              </a:spcAft>
-              <a:buSzPts val="1400"/>
-              <a:buNone/>
-              <a:defRPr/>
-            </a:lvl2pPr>
-            <a:lvl3pPr lvl="2" algn="l">
-              <a:spcBef>
-                <a:spcPts val="0"/>
-              </a:spcBef>
-              <a:spcAft>
-                <a:spcPts val="0"/>
-              </a:spcAft>
-              <a:buSzPts val="1400"/>
-              <a:buNone/>
-              <a:defRPr/>
-            </a:lvl3pPr>
-            <a:lvl4pPr lvl="3" algn="l">
-              <a:spcBef>
-                <a:spcPts val="0"/>
-              </a:spcBef>
-              <a:spcAft>
-                <a:spcPts val="0"/>
-              </a:spcAft>
-              <a:buSzPts val="1400"/>
-              <a:buNone/>
-              <a:defRPr/>
-            </a:lvl4pPr>
-            <a:lvl5pPr lvl="4" algn="l">
-              <a:spcBef>
-                <a:spcPts val="0"/>
-              </a:spcBef>
-              <a:spcAft>
-                <a:spcPts val="0"/>
-              </a:spcAft>
-              <a:buSzPts val="1400"/>
-              <a:buNone/>
-              <a:defRPr/>
-            </a:lvl5pPr>
-            <a:lvl6pPr lvl="5" algn="l">
-              <a:spcBef>
-                <a:spcPts val="0"/>
-              </a:spcBef>
-              <a:spcAft>
-                <a:spcPts val="0"/>
-              </a:spcAft>
-              <a:buSzPts val="1400"/>
-              <a:buNone/>
-              <a:defRPr/>
-            </a:lvl6pPr>
-            <a:lvl7pPr lvl="6" algn="l">
-              <a:spcBef>
-                <a:spcPts val="0"/>
-              </a:spcBef>
-              <a:spcAft>
-                <a:spcPts val="0"/>
-              </a:spcAft>
-              <a:buSzPts val="1400"/>
-              <a:buNone/>
-              <a:defRPr/>
-            </a:lvl7pPr>
-            <a:lvl8pPr lvl="7" algn="l">
-              <a:spcBef>
-                <a:spcPts val="0"/>
-              </a:spcBef>
-              <a:spcAft>
-                <a:spcPts val="0"/>
-              </a:spcAft>
-              <a:buSzPts val="1400"/>
-              <a:buNone/>
-              <a:defRPr/>
-            </a:lvl8pPr>
-            <a:lvl9pPr lvl="8" algn="l">
-              <a:spcBef>
-                <a:spcPts val="0"/>
-              </a:spcBef>
-              <a:spcAft>
-                <a:spcPts val="0"/>
-              </a:spcAft>
-              <a:buSzPts val="1400"/>
-              <a:buNone/>
-              <a:defRPr/>
-            </a:lvl9pPr>
-          </a:lstStyle>
-          <a:p>
-            <a:endParaRPr/>
-          </a:p>
-        </p:txBody>
-      </p:sp>
-      <p:sp>
-        <p:nvSpPr>
-          <p:cNvPr id="25" name="Google Shape;25;p3"/>
-          <p:cNvSpPr txBox="1">
-            <a:spLocks noGrp="1"/>
-          </p:cNvSpPr>
-          <p:nvPr>
-            <p:ph type="ftr" idx="11"/>
-          </p:nvPr>
-        </p:nvSpPr>
-        <p:spPr>
-          <a:xfrm>
-            <a:off x="3028950" y="6356351"/>
-            <a:ext cx="3086100" cy="365125"/>
-          </a:xfrm>
-          <a:prstGeom prst="rect">
-            <a:avLst/>
-          </a:prstGeom>
-          <a:noFill/>
-          <a:ln>
-            <a:noFill/>
-          </a:ln>
-        </p:spPr>
-        <p:txBody>
-          <a:bodyPr spcFirstLastPara="1" wrap="square" lIns="91425" tIns="45700" rIns="91425" bIns="45700" anchor="ctr" anchorCtr="0">
-            <a:noAutofit/>
-          </a:bodyPr>
-          <a:lstStyle>
-            <a:lvl1pPr lvl="0" algn="ctr">
-              <a:spcBef>
-                <a:spcPts val="0"/>
-              </a:spcBef>
-              <a:spcAft>
-                <a:spcPts val="0"/>
-              </a:spcAft>
-              <a:buSzPts val="1400"/>
-              <a:buNone/>
-              <a:defRPr/>
-            </a:lvl1pPr>
-            <a:lvl2pPr lvl="1" algn="l">
-              <a:spcBef>
-                <a:spcPts val="0"/>
-              </a:spcBef>
-              <a:spcAft>
-                <a:spcPts val="0"/>
-              </a:spcAft>
-              <a:buSzPts val="1400"/>
-              <a:buNone/>
-              <a:defRPr/>
-            </a:lvl2pPr>
-            <a:lvl3pPr lvl="2" algn="l">
-              <a:spcBef>
-                <a:spcPts val="0"/>
-              </a:spcBef>
-              <a:spcAft>
-                <a:spcPts val="0"/>
-              </a:spcAft>
-              <a:buSzPts val="1400"/>
-              <a:buNone/>
-              <a:defRPr/>
-            </a:lvl3pPr>
-            <a:lvl4pPr lvl="3" algn="l">
-              <a:spcBef>
-                <a:spcPts val="0"/>
-              </a:spcBef>
-              <a:spcAft>
-                <a:spcPts val="0"/>
-              </a:spcAft>
-              <a:buSzPts val="1400"/>
-              <a:buNone/>
-              <a:defRPr/>
-            </a:lvl4pPr>
-            <a:lvl5pPr lvl="4" algn="l">
-              <a:spcBef>
-                <a:spcPts val="0"/>
-              </a:spcBef>
-              <a:spcAft>
-                <a:spcPts val="0"/>
-              </a:spcAft>
-              <a:buSzPts val="1400"/>
-              <a:buNone/>
-              <a:defRPr/>
-            </a:lvl5pPr>
-            <a:lvl6pPr lvl="5" algn="l">
-              <a:spcBef>
-                <a:spcPts val="0"/>
-              </a:spcBef>
-              <a:spcAft>
-                <a:spcPts val="0"/>
-              </a:spcAft>
-              <a:buSzPts val="1400"/>
-              <a:buNone/>
-              <a:defRPr/>
-            </a:lvl6pPr>
-            <a:lvl7pPr lvl="6" algn="l">
-              <a:spcBef>
-                <a:spcPts val="0"/>
-              </a:spcBef>
-              <a:spcAft>
-                <a:spcPts val="0"/>
-              </a:spcAft>
-              <a:buSzPts val="1400"/>
-              <a:buNone/>
-              <a:defRPr/>
-            </a:lvl7pPr>
-            <a:lvl8pPr lvl="7" algn="l">
-              <a:spcBef>
-                <a:spcPts val="0"/>
-              </a:spcBef>
-              <a:spcAft>
-                <a:spcPts val="0"/>
-              </a:spcAft>
-              <a:buSzPts val="1400"/>
-              <a:buNone/>
-              <a:defRPr/>
-            </a:lvl8pPr>
-            <a:lvl9pPr lvl="8" algn="l">
-              <a:spcBef>
-                <a:spcPts val="0"/>
-              </a:spcBef>
-              <a:spcAft>
-                <a:spcPts val="0"/>
-              </a:spcAft>
-              <a:buSzPts val="1400"/>
-              <a:buNone/>
-              <a:defRPr/>
-            </a:lvl9pPr>
-          </a:lstStyle>
-          <a:p>
-            <a:endParaRPr/>
-          </a:p>
-        </p:txBody>
-      </p:sp>
-      <p:sp>
-        <p:nvSpPr>
-          <p:cNvPr id="26" name="Google Shape;26;p3"/>
-          <p:cNvSpPr txBox="1">
-            <a:spLocks noGrp="1"/>
-          </p:cNvSpPr>
-          <p:nvPr>
-            <p:ph type="sldNum" idx="12"/>
-          </p:nvPr>
-        </p:nvSpPr>
-        <p:spPr>
-          <a:xfrm>
-            <a:off x="6457950" y="6356351"/>
-            <a:ext cx="2057400" cy="365125"/>
-          </a:xfrm>
-          <a:prstGeom prst="rect">
-            <a:avLst/>
-          </a:prstGeom>
-          <a:noFill/>
-          <a:ln>
-            <a:noFill/>
-          </a:ln>
-        </p:spPr>
-        <p:txBody>
-          <a:bodyPr spcFirstLastPara="1" wrap="square" lIns="91425" tIns="45700" rIns="91425" bIns="45700" anchor="ctr" anchorCtr="0">
-            <a:noAutofit/>
-          </a:bodyPr>
-          <a:lstStyle>
-            <a:lvl1pPr marL="0" lvl="0" indent="0" algn="r">
-              <a:spcBef>
-                <a:spcPts val="0"/>
-              </a:spcBef>
-              <a:buNone/>
-              <a:defRPr/>
-            </a:lvl1pPr>
-            <a:lvl2pPr marL="0" lvl="1" indent="0" algn="r">
-              <a:spcBef>
-                <a:spcPts val="0"/>
-              </a:spcBef>
-              <a:buNone/>
-              <a:defRPr/>
-            </a:lvl2pPr>
-            <a:lvl3pPr marL="0" lvl="2" indent="0" algn="r">
-              <a:spcBef>
-                <a:spcPts val="0"/>
-              </a:spcBef>
-              <a:buNone/>
-              <a:defRPr/>
-            </a:lvl3pPr>
-            <a:lvl4pPr marL="0" lvl="3" indent="0" algn="r">
-              <a:spcBef>
-                <a:spcPts val="0"/>
-              </a:spcBef>
-              <a:buNone/>
-              <a:defRPr/>
-            </a:lvl4pPr>
-            <a:lvl5pPr marL="0" lvl="4" indent="0" algn="r">
-              <a:spcBef>
-                <a:spcPts val="0"/>
-              </a:spcBef>
-              <a:buNone/>
-              <a:defRPr/>
-            </a:lvl5pPr>
-            <a:lvl6pPr marL="0" lvl="5" indent="0" algn="r">
-              <a:spcBef>
-                <a:spcPts val="0"/>
-              </a:spcBef>
-              <a:buNone/>
-              <a:defRPr/>
-            </a:lvl6pPr>
-            <a:lvl7pPr marL="0" lvl="6" indent="0" algn="r">
-              <a:spcBef>
-                <a:spcPts val="0"/>
-              </a:spcBef>
-              <a:buNone/>
-              <a:defRPr/>
-            </a:lvl7pPr>
-            <a:lvl8pPr marL="0" lvl="7" indent="0" algn="r">
-              <a:spcBef>
-                <a:spcPts val="0"/>
-              </a:spcBef>
-              <a:buNone/>
-              <a:defRPr/>
-            </a:lvl8pPr>
-            <a:lvl9pPr marL="0" lvl="8" indent="0" algn="r">
-              <a:spcBef>
-                <a:spcPts val="0"/>
-              </a:spcBef>
-              <a:buNone/>
-              <a:defRPr/>
-            </a:lvl9pPr>
-          </a:lstStyle>
-          <a:p>
-            <a:fld id="{00000000-1234-1234-1234-123412341234}" type="slidenum">
-              <a:rPr lang="en-US" smtClean="0"/>
-              <a:pPr/>
-              <a:t>‹#›</a:t>
-            </a:fld>
-            <a:endParaRPr lang="en-US"/>
-          </a:p>
-        </p:txBody>
-      </p:sp>
-    </p:spTree>
-  </p:cSld>
-  <p:clrMapOvr>
-    <a:masterClrMapping/>
-  </p:clrMapOvr>
-</p:sldLayout>
-</file>
-
-<file path=ppt/slideLayouts/slideLayout3.xml><?xml version="1.0" encoding="utf-8"?>
 <p:sldLayout xmlns:a="http://schemas.openxmlformats.org/drawingml/2006/main" xmlns:r="http://schemas.openxmlformats.org/officeDocument/2006/relationships" xmlns:p="http://schemas.openxmlformats.org/presentationml/2006/main" matchingName="Section Header" type="secHead">
   <p:cSld name="SECTION_HEADER">
     <p:spTree>
@@ -5415,7 +3762,7 @@
 </p:sldLayout>
 </file>
 
-<file path=ppt/slideLayouts/slideLayout4.xml><?xml version="1.0" encoding="utf-8"?>
+<file path=ppt/slideLayouts/slideLayout3.xml><?xml version="1.0" encoding="utf-8"?>
 <p:sldLayout xmlns:a="http://schemas.openxmlformats.org/drawingml/2006/main" xmlns:r="http://schemas.openxmlformats.org/officeDocument/2006/relationships" xmlns:p="http://schemas.openxmlformats.org/presentationml/2006/main" matchingName="Two Content" type="twoObj">
   <p:cSld name="TWO_OBJECTS">
     <p:spTree>
@@ -6321,7 +4668,7 @@
 </p:sldLayout>
 </file>
 
-<file path=ppt/slideLayouts/slideLayout5.xml><?xml version="1.0" encoding="utf-8"?>
+<file path=ppt/slideLayouts/slideLayout4.xml><?xml version="1.0" encoding="utf-8"?>
 <p:sldLayout xmlns:a="http://schemas.openxmlformats.org/drawingml/2006/main" xmlns:r="http://schemas.openxmlformats.org/officeDocument/2006/relationships" xmlns:p="http://schemas.openxmlformats.org/presentationml/2006/main" matchingName="Comparison" type="twoTxTwoObj">
   <p:cSld name="TWO_OBJECTS_WITH_TEXT">
     <p:spTree>
@@ -7601,7 +5948,7 @@
 </p:sldLayout>
 </file>
 
-<file path=ppt/slideLayouts/slideLayout6.xml><?xml version="1.0" encoding="utf-8"?>
+<file path=ppt/slideLayouts/slideLayout5.xml><?xml version="1.0" encoding="utf-8"?>
 <p:sldLayout xmlns:a="http://schemas.openxmlformats.org/drawingml/2006/main" xmlns:r="http://schemas.openxmlformats.org/officeDocument/2006/relationships" xmlns:p="http://schemas.openxmlformats.org/presentationml/2006/main" matchingName="Title Only" type="titleOnly">
   <p:cSld name="TITLE_ONLY">
     <p:spTree>
@@ -8133,7 +6480,7 @@
 </p:sldLayout>
 </file>
 
-<file path=ppt/slideLayouts/slideLayout7.xml><?xml version="1.0" encoding="utf-8"?>
+<file path=ppt/slideLayouts/slideLayout6.xml><?xml version="1.0" encoding="utf-8"?>
 <p:sldLayout xmlns:a="http://schemas.openxmlformats.org/drawingml/2006/main" xmlns:r="http://schemas.openxmlformats.org/officeDocument/2006/relationships" xmlns:p="http://schemas.openxmlformats.org/presentationml/2006/main" matchingName="Blank" type="blank">
   <p:cSld name="BLANK">
     <p:spTree>
@@ -8526,7 +6873,7 @@
 </p:sldLayout>
 </file>
 
-<file path=ppt/slideLayouts/slideLayout8.xml><?xml version="1.0" encoding="utf-8"?>
+<file path=ppt/slideLayouts/slideLayout7.xml><?xml version="1.0" encoding="utf-8"?>
 <p:sldLayout xmlns:a="http://schemas.openxmlformats.org/drawingml/2006/main" xmlns:r="http://schemas.openxmlformats.org/officeDocument/2006/relationships" xmlns:p="http://schemas.openxmlformats.org/presentationml/2006/main" matchingName="Content with Caption" type="objTx">
   <p:cSld name="OBJECT_WITH_CAPTION_TEXT">
     <p:spTree>
@@ -9433,7 +7780,7 @@
 </p:sldLayout>
 </file>
 
-<file path=ppt/slideLayouts/slideLayout9.xml><?xml version="1.0" encoding="utf-8"?>
+<file path=ppt/slideLayouts/slideLayout8.xml><?xml version="1.0" encoding="utf-8"?>
 <p:sldLayout xmlns:a="http://schemas.openxmlformats.org/drawingml/2006/main" xmlns:r="http://schemas.openxmlformats.org/officeDocument/2006/relationships" xmlns:p="http://schemas.openxmlformats.org/presentationml/2006/main" matchingName="Picture with Caption" type="picTx">
   <p:cSld name="PICTURE_WITH_CAPTION_TEXT">
     <p:spTree>
@@ -10070,6 +8417,725 @@
       <p:sp>
         <p:nvSpPr>
           <p:cNvPr id="71" name="Google Shape;71;p10"/>
+          <p:cNvSpPr txBox="1">
+            <a:spLocks noGrp="1"/>
+          </p:cNvSpPr>
+          <p:nvPr>
+            <p:ph type="sldNum" idx="12"/>
+          </p:nvPr>
+        </p:nvSpPr>
+        <p:spPr>
+          <a:xfrm>
+            <a:off x="6457950" y="6356351"/>
+            <a:ext cx="2057400" cy="365125"/>
+          </a:xfrm>
+          <a:prstGeom prst="rect">
+            <a:avLst/>
+          </a:prstGeom>
+          <a:noFill/>
+          <a:ln>
+            <a:noFill/>
+          </a:ln>
+        </p:spPr>
+        <p:txBody>
+          <a:bodyPr spcFirstLastPara="1" wrap="square" lIns="91425" tIns="45700" rIns="91425" bIns="45700" anchor="ctr" anchorCtr="0">
+            <a:noAutofit/>
+          </a:bodyPr>
+          <a:lstStyle>
+            <a:lvl1pPr marL="0" lvl="0" indent="0" algn="r">
+              <a:spcBef>
+                <a:spcPts val="0"/>
+              </a:spcBef>
+              <a:buNone/>
+              <a:defRPr/>
+            </a:lvl1pPr>
+            <a:lvl2pPr marL="0" lvl="1" indent="0" algn="r">
+              <a:spcBef>
+                <a:spcPts val="0"/>
+              </a:spcBef>
+              <a:buNone/>
+              <a:defRPr/>
+            </a:lvl2pPr>
+            <a:lvl3pPr marL="0" lvl="2" indent="0" algn="r">
+              <a:spcBef>
+                <a:spcPts val="0"/>
+              </a:spcBef>
+              <a:buNone/>
+              <a:defRPr/>
+            </a:lvl3pPr>
+            <a:lvl4pPr marL="0" lvl="3" indent="0" algn="r">
+              <a:spcBef>
+                <a:spcPts val="0"/>
+              </a:spcBef>
+              <a:buNone/>
+              <a:defRPr/>
+            </a:lvl4pPr>
+            <a:lvl5pPr marL="0" lvl="4" indent="0" algn="r">
+              <a:spcBef>
+                <a:spcPts val="0"/>
+              </a:spcBef>
+              <a:buNone/>
+              <a:defRPr/>
+            </a:lvl5pPr>
+            <a:lvl6pPr marL="0" lvl="5" indent="0" algn="r">
+              <a:spcBef>
+                <a:spcPts val="0"/>
+              </a:spcBef>
+              <a:buNone/>
+              <a:defRPr/>
+            </a:lvl6pPr>
+            <a:lvl7pPr marL="0" lvl="6" indent="0" algn="r">
+              <a:spcBef>
+                <a:spcPts val="0"/>
+              </a:spcBef>
+              <a:buNone/>
+              <a:defRPr/>
+            </a:lvl7pPr>
+            <a:lvl8pPr marL="0" lvl="7" indent="0" algn="r">
+              <a:spcBef>
+                <a:spcPts val="0"/>
+              </a:spcBef>
+              <a:buNone/>
+              <a:defRPr/>
+            </a:lvl8pPr>
+            <a:lvl9pPr marL="0" lvl="8" indent="0" algn="r">
+              <a:spcBef>
+                <a:spcPts val="0"/>
+              </a:spcBef>
+              <a:buNone/>
+              <a:defRPr/>
+            </a:lvl9pPr>
+          </a:lstStyle>
+          <a:p>
+            <a:fld id="{00000000-1234-1234-1234-123412341234}" type="slidenum">
+              <a:rPr lang="en-US" smtClean="0"/>
+              <a:pPr/>
+              <a:t>‹#›</a:t>
+            </a:fld>
+            <a:endParaRPr lang="en-US"/>
+          </a:p>
+        </p:txBody>
+      </p:sp>
+    </p:spTree>
+  </p:cSld>
+  <p:clrMapOvr>
+    <a:masterClrMapping/>
+  </p:clrMapOvr>
+</p:sldLayout>
+</file>
+
+<file path=ppt/slideLayouts/slideLayout9.xml><?xml version="1.0" encoding="utf-8"?>
+<p:sldLayout xmlns:a="http://schemas.openxmlformats.org/drawingml/2006/main" xmlns:r="http://schemas.openxmlformats.org/officeDocument/2006/relationships" xmlns:p="http://schemas.openxmlformats.org/presentationml/2006/main" matchingName="Title and Vertical Text" type="vertTx">
+  <p:cSld name="VERTICAL_TEXT">
+    <p:spTree>
+      <p:nvGrpSpPr>
+        <p:cNvPr id="1" name="Shape 72"/>
+        <p:cNvGrpSpPr/>
+        <p:nvPr/>
+      </p:nvGrpSpPr>
+      <p:grpSpPr>
+        <a:xfrm>
+          <a:off x="0" y="0"/>
+          <a:ext cx="0" cy="0"/>
+          <a:chOff x="0" y="0"/>
+          <a:chExt cx="0" cy="0"/>
+        </a:xfrm>
+      </p:grpSpPr>
+      <p:sp>
+        <p:nvSpPr>
+          <p:cNvPr id="73" name="Google Shape;73;p11"/>
+          <p:cNvSpPr txBox="1">
+            <a:spLocks noGrp="1"/>
+          </p:cNvSpPr>
+          <p:nvPr>
+            <p:ph type="title"/>
+          </p:nvPr>
+        </p:nvSpPr>
+        <p:spPr>
+          <a:xfrm>
+            <a:off x="628650" y="365126"/>
+            <a:ext cx="7886700" cy="1325563"/>
+          </a:xfrm>
+          <a:prstGeom prst="rect">
+            <a:avLst/>
+          </a:prstGeom>
+          <a:noFill/>
+          <a:ln>
+            <a:noFill/>
+          </a:ln>
+        </p:spPr>
+        <p:txBody>
+          <a:bodyPr spcFirstLastPara="1" wrap="square" lIns="91425" tIns="45700" rIns="91425" bIns="45700" anchor="ctr" anchorCtr="0">
+            <a:normAutofit/>
+          </a:bodyPr>
+          <a:lstStyle>
+            <a:lvl1pPr lvl="0" algn="l">
+              <a:lnSpc>
+                <a:spcPct val="90000"/>
+              </a:lnSpc>
+              <a:spcBef>
+                <a:spcPts val="0"/>
+              </a:spcBef>
+              <a:spcAft>
+                <a:spcPts val="0"/>
+              </a:spcAft>
+              <a:buClr>
+                <a:schemeClr val="dk1"/>
+              </a:buClr>
+              <a:buSzPts val="1800"/>
+              <a:buNone/>
+              <a:defRPr/>
+            </a:lvl1pPr>
+            <a:lvl2pPr lvl="1">
+              <a:spcBef>
+                <a:spcPts val="0"/>
+              </a:spcBef>
+              <a:spcAft>
+                <a:spcPts val="0"/>
+              </a:spcAft>
+              <a:buSzPts val="1400"/>
+              <a:buNone/>
+              <a:defRPr/>
+            </a:lvl2pPr>
+            <a:lvl3pPr lvl="2">
+              <a:spcBef>
+                <a:spcPts val="0"/>
+              </a:spcBef>
+              <a:spcAft>
+                <a:spcPts val="0"/>
+              </a:spcAft>
+              <a:buSzPts val="1400"/>
+              <a:buNone/>
+              <a:defRPr/>
+            </a:lvl3pPr>
+            <a:lvl4pPr lvl="3">
+              <a:spcBef>
+                <a:spcPts val="0"/>
+              </a:spcBef>
+              <a:spcAft>
+                <a:spcPts val="0"/>
+              </a:spcAft>
+              <a:buSzPts val="1400"/>
+              <a:buNone/>
+              <a:defRPr/>
+            </a:lvl4pPr>
+            <a:lvl5pPr lvl="4">
+              <a:spcBef>
+                <a:spcPts val="0"/>
+              </a:spcBef>
+              <a:spcAft>
+                <a:spcPts val="0"/>
+              </a:spcAft>
+              <a:buSzPts val="1400"/>
+              <a:buNone/>
+              <a:defRPr/>
+            </a:lvl5pPr>
+            <a:lvl6pPr lvl="5">
+              <a:spcBef>
+                <a:spcPts val="0"/>
+              </a:spcBef>
+              <a:spcAft>
+                <a:spcPts val="0"/>
+              </a:spcAft>
+              <a:buSzPts val="1400"/>
+              <a:buNone/>
+              <a:defRPr/>
+            </a:lvl6pPr>
+            <a:lvl7pPr lvl="6">
+              <a:spcBef>
+                <a:spcPts val="0"/>
+              </a:spcBef>
+              <a:spcAft>
+                <a:spcPts val="0"/>
+              </a:spcAft>
+              <a:buSzPts val="1400"/>
+              <a:buNone/>
+              <a:defRPr/>
+            </a:lvl7pPr>
+            <a:lvl8pPr lvl="7">
+              <a:spcBef>
+                <a:spcPts val="0"/>
+              </a:spcBef>
+              <a:spcAft>
+                <a:spcPts val="0"/>
+              </a:spcAft>
+              <a:buSzPts val="1400"/>
+              <a:buNone/>
+              <a:defRPr/>
+            </a:lvl8pPr>
+            <a:lvl9pPr lvl="8">
+              <a:spcBef>
+                <a:spcPts val="0"/>
+              </a:spcBef>
+              <a:spcAft>
+                <a:spcPts val="0"/>
+              </a:spcAft>
+              <a:buSzPts val="1400"/>
+              <a:buNone/>
+              <a:defRPr/>
+            </a:lvl9pPr>
+          </a:lstStyle>
+          <a:p>
+            <a:endParaRPr/>
+          </a:p>
+        </p:txBody>
+      </p:sp>
+      <p:sp>
+        <p:nvSpPr>
+          <p:cNvPr id="74" name="Google Shape;74;p11"/>
+          <p:cNvSpPr txBox="1">
+            <a:spLocks noGrp="1"/>
+          </p:cNvSpPr>
+          <p:nvPr>
+            <p:ph type="body" idx="1"/>
+          </p:nvPr>
+        </p:nvSpPr>
+        <p:spPr>
+          <a:xfrm rot="5400000">
+            <a:off x="2396331" y="57944"/>
+            <a:ext cx="4351338" cy="7886700"/>
+          </a:xfrm>
+          <a:prstGeom prst="rect">
+            <a:avLst/>
+          </a:prstGeom>
+          <a:noFill/>
+          <a:ln>
+            <a:noFill/>
+          </a:ln>
+        </p:spPr>
+        <p:txBody>
+          <a:bodyPr spcFirstLastPara="1" wrap="square" lIns="91425" tIns="45700" rIns="91425" bIns="45700" anchor="t" anchorCtr="0">
+            <a:normAutofit/>
+          </a:bodyPr>
+          <a:lstStyle>
+            <a:lvl1pPr marL="342900" lvl="0" indent="-257175" algn="l">
+              <a:lnSpc>
+                <a:spcPct val="90000"/>
+              </a:lnSpc>
+              <a:spcBef>
+                <a:spcPts val="750"/>
+              </a:spcBef>
+              <a:spcAft>
+                <a:spcPts val="0"/>
+              </a:spcAft>
+              <a:buClr>
+                <a:schemeClr val="dk1"/>
+              </a:buClr>
+              <a:buSzPts val="1800"/>
+              <a:buChar char="•"/>
+              <a:defRPr/>
+            </a:lvl1pPr>
+            <a:lvl2pPr marL="685800" lvl="1" indent="-257175" algn="l">
+              <a:lnSpc>
+                <a:spcPct val="90000"/>
+              </a:lnSpc>
+              <a:spcBef>
+                <a:spcPts val="375"/>
+              </a:spcBef>
+              <a:spcAft>
+                <a:spcPts val="0"/>
+              </a:spcAft>
+              <a:buClr>
+                <a:schemeClr val="dk1"/>
+              </a:buClr>
+              <a:buSzPts val="1800"/>
+              <a:buChar char="•"/>
+              <a:defRPr/>
+            </a:lvl2pPr>
+            <a:lvl3pPr marL="1028700" lvl="2" indent="-257175" algn="l">
+              <a:lnSpc>
+                <a:spcPct val="90000"/>
+              </a:lnSpc>
+              <a:spcBef>
+                <a:spcPts val="375"/>
+              </a:spcBef>
+              <a:spcAft>
+                <a:spcPts val="0"/>
+              </a:spcAft>
+              <a:buClr>
+                <a:schemeClr val="dk1"/>
+              </a:buClr>
+              <a:buSzPts val="1800"/>
+              <a:buChar char="•"/>
+              <a:defRPr/>
+            </a:lvl3pPr>
+            <a:lvl4pPr marL="1371600" lvl="3" indent="-257175" algn="l">
+              <a:lnSpc>
+                <a:spcPct val="90000"/>
+              </a:lnSpc>
+              <a:spcBef>
+                <a:spcPts val="375"/>
+              </a:spcBef>
+              <a:spcAft>
+                <a:spcPts val="0"/>
+              </a:spcAft>
+              <a:buClr>
+                <a:schemeClr val="dk1"/>
+              </a:buClr>
+              <a:buSzPts val="1800"/>
+              <a:buChar char="•"/>
+              <a:defRPr/>
+            </a:lvl4pPr>
+            <a:lvl5pPr marL="1714500" lvl="4" indent="-257175" algn="l">
+              <a:lnSpc>
+                <a:spcPct val="90000"/>
+              </a:lnSpc>
+              <a:spcBef>
+                <a:spcPts val="375"/>
+              </a:spcBef>
+              <a:spcAft>
+                <a:spcPts val="0"/>
+              </a:spcAft>
+              <a:buClr>
+                <a:schemeClr val="dk1"/>
+              </a:buClr>
+              <a:buSzPts val="1800"/>
+              <a:buChar char="•"/>
+              <a:defRPr/>
+            </a:lvl5pPr>
+            <a:lvl6pPr marL="2057400" lvl="5" indent="-257175" algn="l">
+              <a:lnSpc>
+                <a:spcPct val="90000"/>
+              </a:lnSpc>
+              <a:spcBef>
+                <a:spcPts val="375"/>
+              </a:spcBef>
+              <a:spcAft>
+                <a:spcPts val="0"/>
+              </a:spcAft>
+              <a:buClr>
+                <a:schemeClr val="dk1"/>
+              </a:buClr>
+              <a:buSzPts val="1800"/>
+              <a:buChar char="•"/>
+              <a:defRPr/>
+            </a:lvl6pPr>
+            <a:lvl7pPr marL="2400300" lvl="6" indent="-257175" algn="l">
+              <a:lnSpc>
+                <a:spcPct val="90000"/>
+              </a:lnSpc>
+              <a:spcBef>
+                <a:spcPts val="375"/>
+              </a:spcBef>
+              <a:spcAft>
+                <a:spcPts val="0"/>
+              </a:spcAft>
+              <a:buClr>
+                <a:schemeClr val="dk1"/>
+              </a:buClr>
+              <a:buSzPts val="1800"/>
+              <a:buChar char="•"/>
+              <a:defRPr/>
+            </a:lvl7pPr>
+            <a:lvl8pPr marL="2743200" lvl="7" indent="-257175" algn="l">
+              <a:lnSpc>
+                <a:spcPct val="90000"/>
+              </a:lnSpc>
+              <a:spcBef>
+                <a:spcPts val="375"/>
+              </a:spcBef>
+              <a:spcAft>
+                <a:spcPts val="0"/>
+              </a:spcAft>
+              <a:buClr>
+                <a:schemeClr val="dk1"/>
+              </a:buClr>
+              <a:buSzPts val="1800"/>
+              <a:buChar char="•"/>
+              <a:defRPr/>
+            </a:lvl8pPr>
+            <a:lvl9pPr marL="3086100" lvl="8" indent="-257175" algn="l">
+              <a:lnSpc>
+                <a:spcPct val="90000"/>
+              </a:lnSpc>
+              <a:spcBef>
+                <a:spcPts val="375"/>
+              </a:spcBef>
+              <a:spcAft>
+                <a:spcPts val="0"/>
+              </a:spcAft>
+              <a:buClr>
+                <a:schemeClr val="dk1"/>
+              </a:buClr>
+              <a:buSzPts val="1800"/>
+              <a:buChar char="•"/>
+              <a:defRPr/>
+            </a:lvl9pPr>
+          </a:lstStyle>
+          <a:p>
+            <a:endParaRPr/>
+          </a:p>
+        </p:txBody>
+      </p:sp>
+      <p:sp>
+        <p:nvSpPr>
+          <p:cNvPr id="75" name="Google Shape;75;p11"/>
+          <p:cNvSpPr txBox="1">
+            <a:spLocks noGrp="1"/>
+          </p:cNvSpPr>
+          <p:nvPr>
+            <p:ph type="dt" idx="10"/>
+          </p:nvPr>
+        </p:nvSpPr>
+        <p:spPr>
+          <a:xfrm>
+            <a:off x="628650" y="6356351"/>
+            <a:ext cx="2057400" cy="365125"/>
+          </a:xfrm>
+          <a:prstGeom prst="rect">
+            <a:avLst/>
+          </a:prstGeom>
+          <a:noFill/>
+          <a:ln>
+            <a:noFill/>
+          </a:ln>
+        </p:spPr>
+        <p:txBody>
+          <a:bodyPr spcFirstLastPara="1" wrap="square" lIns="91425" tIns="45700" rIns="91425" bIns="45700" anchor="ctr" anchorCtr="0">
+            <a:noAutofit/>
+          </a:bodyPr>
+          <a:lstStyle>
+            <a:lvl1pPr lvl="0" algn="l">
+              <a:spcBef>
+                <a:spcPts val="0"/>
+              </a:spcBef>
+              <a:spcAft>
+                <a:spcPts val="0"/>
+              </a:spcAft>
+              <a:buSzPts val="1400"/>
+              <a:buNone/>
+              <a:defRPr/>
+            </a:lvl1pPr>
+            <a:lvl2pPr lvl="1" algn="l">
+              <a:spcBef>
+                <a:spcPts val="0"/>
+              </a:spcBef>
+              <a:spcAft>
+                <a:spcPts val="0"/>
+              </a:spcAft>
+              <a:buSzPts val="1400"/>
+              <a:buNone/>
+              <a:defRPr/>
+            </a:lvl2pPr>
+            <a:lvl3pPr lvl="2" algn="l">
+              <a:spcBef>
+                <a:spcPts val="0"/>
+              </a:spcBef>
+              <a:spcAft>
+                <a:spcPts val="0"/>
+              </a:spcAft>
+              <a:buSzPts val="1400"/>
+              <a:buNone/>
+              <a:defRPr/>
+            </a:lvl3pPr>
+            <a:lvl4pPr lvl="3" algn="l">
+              <a:spcBef>
+                <a:spcPts val="0"/>
+              </a:spcBef>
+              <a:spcAft>
+                <a:spcPts val="0"/>
+              </a:spcAft>
+              <a:buSzPts val="1400"/>
+              <a:buNone/>
+              <a:defRPr/>
+            </a:lvl4pPr>
+            <a:lvl5pPr lvl="4" algn="l">
+              <a:spcBef>
+                <a:spcPts val="0"/>
+              </a:spcBef>
+              <a:spcAft>
+                <a:spcPts val="0"/>
+              </a:spcAft>
+              <a:buSzPts val="1400"/>
+              <a:buNone/>
+              <a:defRPr/>
+            </a:lvl5pPr>
+            <a:lvl6pPr lvl="5" algn="l">
+              <a:spcBef>
+                <a:spcPts val="0"/>
+              </a:spcBef>
+              <a:spcAft>
+                <a:spcPts val="0"/>
+              </a:spcAft>
+              <a:buSzPts val="1400"/>
+              <a:buNone/>
+              <a:defRPr/>
+            </a:lvl6pPr>
+            <a:lvl7pPr lvl="6" algn="l">
+              <a:spcBef>
+                <a:spcPts val="0"/>
+              </a:spcBef>
+              <a:spcAft>
+                <a:spcPts val="0"/>
+              </a:spcAft>
+              <a:buSzPts val="1400"/>
+              <a:buNone/>
+              <a:defRPr/>
+            </a:lvl7pPr>
+            <a:lvl8pPr lvl="7" algn="l">
+              <a:spcBef>
+                <a:spcPts val="0"/>
+              </a:spcBef>
+              <a:spcAft>
+                <a:spcPts val="0"/>
+              </a:spcAft>
+              <a:buSzPts val="1400"/>
+              <a:buNone/>
+              <a:defRPr/>
+            </a:lvl8pPr>
+            <a:lvl9pPr lvl="8" algn="l">
+              <a:spcBef>
+                <a:spcPts val="0"/>
+              </a:spcBef>
+              <a:spcAft>
+                <a:spcPts val="0"/>
+              </a:spcAft>
+              <a:buSzPts val="1400"/>
+              <a:buNone/>
+              <a:defRPr/>
+            </a:lvl9pPr>
+          </a:lstStyle>
+          <a:p>
+            <a:endParaRPr/>
+          </a:p>
+        </p:txBody>
+      </p:sp>
+      <p:sp>
+        <p:nvSpPr>
+          <p:cNvPr id="76" name="Google Shape;76;p11"/>
+          <p:cNvSpPr txBox="1">
+            <a:spLocks noGrp="1"/>
+          </p:cNvSpPr>
+          <p:nvPr>
+            <p:ph type="ftr" idx="11"/>
+          </p:nvPr>
+        </p:nvSpPr>
+        <p:spPr>
+          <a:xfrm>
+            <a:off x="3028950" y="6356351"/>
+            <a:ext cx="3086100" cy="365125"/>
+          </a:xfrm>
+          <a:prstGeom prst="rect">
+            <a:avLst/>
+          </a:prstGeom>
+          <a:noFill/>
+          <a:ln>
+            <a:noFill/>
+          </a:ln>
+        </p:spPr>
+        <p:txBody>
+          <a:bodyPr spcFirstLastPara="1" wrap="square" lIns="91425" tIns="45700" rIns="91425" bIns="45700" anchor="ctr" anchorCtr="0">
+            <a:noAutofit/>
+          </a:bodyPr>
+          <a:lstStyle>
+            <a:lvl1pPr lvl="0" algn="ctr">
+              <a:spcBef>
+                <a:spcPts val="0"/>
+              </a:spcBef>
+              <a:spcAft>
+                <a:spcPts val="0"/>
+              </a:spcAft>
+              <a:buSzPts val="1400"/>
+              <a:buNone/>
+              <a:defRPr/>
+            </a:lvl1pPr>
+            <a:lvl2pPr lvl="1" algn="l">
+              <a:spcBef>
+                <a:spcPts val="0"/>
+              </a:spcBef>
+              <a:spcAft>
+                <a:spcPts val="0"/>
+              </a:spcAft>
+              <a:buSzPts val="1400"/>
+              <a:buNone/>
+              <a:defRPr/>
+            </a:lvl2pPr>
+            <a:lvl3pPr lvl="2" algn="l">
+              <a:spcBef>
+                <a:spcPts val="0"/>
+              </a:spcBef>
+              <a:spcAft>
+                <a:spcPts val="0"/>
+              </a:spcAft>
+              <a:buSzPts val="1400"/>
+              <a:buNone/>
+              <a:defRPr/>
+            </a:lvl3pPr>
+            <a:lvl4pPr lvl="3" algn="l">
+              <a:spcBef>
+                <a:spcPts val="0"/>
+              </a:spcBef>
+              <a:spcAft>
+                <a:spcPts val="0"/>
+              </a:spcAft>
+              <a:buSzPts val="1400"/>
+              <a:buNone/>
+              <a:defRPr/>
+            </a:lvl4pPr>
+            <a:lvl5pPr lvl="4" algn="l">
+              <a:spcBef>
+                <a:spcPts val="0"/>
+              </a:spcBef>
+              <a:spcAft>
+                <a:spcPts val="0"/>
+              </a:spcAft>
+              <a:buSzPts val="1400"/>
+              <a:buNone/>
+              <a:defRPr/>
+            </a:lvl5pPr>
+            <a:lvl6pPr lvl="5" algn="l">
+              <a:spcBef>
+                <a:spcPts val="0"/>
+              </a:spcBef>
+              <a:spcAft>
+                <a:spcPts val="0"/>
+              </a:spcAft>
+              <a:buSzPts val="1400"/>
+              <a:buNone/>
+              <a:defRPr/>
+            </a:lvl6pPr>
+            <a:lvl7pPr lvl="6" algn="l">
+              <a:spcBef>
+                <a:spcPts val="0"/>
+              </a:spcBef>
+              <a:spcAft>
+                <a:spcPts val="0"/>
+              </a:spcAft>
+              <a:buSzPts val="1400"/>
+              <a:buNone/>
+              <a:defRPr/>
+            </a:lvl7pPr>
+            <a:lvl8pPr lvl="7" algn="l">
+              <a:spcBef>
+                <a:spcPts val="0"/>
+              </a:spcBef>
+              <a:spcAft>
+                <a:spcPts val="0"/>
+              </a:spcAft>
+              <a:buSzPts val="1400"/>
+              <a:buNone/>
+              <a:defRPr/>
+            </a:lvl8pPr>
+            <a:lvl9pPr lvl="8" algn="l">
+              <a:spcBef>
+                <a:spcPts val="0"/>
+              </a:spcBef>
+              <a:spcAft>
+                <a:spcPts val="0"/>
+              </a:spcAft>
+              <a:buSzPts val="1400"/>
+              <a:buNone/>
+              <a:defRPr/>
+            </a:lvl9pPr>
+          </a:lstStyle>
+          <a:p>
+            <a:endParaRPr/>
+          </a:p>
+        </p:txBody>
+      </p:sp>
+      <p:sp>
+        <p:nvSpPr>
+          <p:cNvPr id="77" name="Google Shape;77;p11"/>
           <p:cNvSpPr txBox="1">
             <a:spLocks noGrp="1"/>
           </p:cNvSpPr>
@@ -11206,17 +10272,16 @@
   </p:cSld>
   <p:clrMap bg1="lt1" tx1="dk1" bg2="dk2" tx2="lt2" accent1="accent1" accent2="accent2" accent3="accent3" accent4="accent4" accent5="accent5" accent6="accent6" hlink="hlink" folHlink="folHlink"/>
   <p:sldLayoutIdLst>
-    <p:sldLayoutId id="2147483648" r:id="rId1"/>
-    <p:sldLayoutId id="2147483649" r:id="rId2"/>
-    <p:sldLayoutId id="2147483650" r:id="rId3"/>
-    <p:sldLayoutId id="2147483651" r:id="rId4"/>
-    <p:sldLayoutId id="2147483652" r:id="rId5"/>
-    <p:sldLayoutId id="2147483653" r:id="rId6"/>
-    <p:sldLayoutId id="2147483654" r:id="rId7"/>
-    <p:sldLayoutId id="2147483655" r:id="rId8"/>
-    <p:sldLayoutId id="2147483656" r:id="rId9"/>
-    <p:sldLayoutId id="2147483657" r:id="rId10"/>
-    <p:sldLayoutId id="2147483658" r:id="rId11"/>
+    <p:sldLayoutId id="2147483649" r:id="rId1"/>
+    <p:sldLayoutId id="2147483650" r:id="rId2"/>
+    <p:sldLayoutId id="2147483651" r:id="rId3"/>
+    <p:sldLayoutId id="2147483652" r:id="rId4"/>
+    <p:sldLayoutId id="2147483653" r:id="rId5"/>
+    <p:sldLayoutId id="2147483654" r:id="rId6"/>
+    <p:sldLayoutId id="2147483655" r:id="rId7"/>
+    <p:sldLayoutId id="2147483656" r:id="rId8"/>
+    <p:sldLayoutId id="2147483657" r:id="rId9"/>
+    <p:sldLayoutId id="2147483658" r:id="rId10"/>
   </p:sldLayoutIdLst>
   <p:hf sldNum="0" hdr="0" ftr="0" dt="0"/>
   <p:txStyles>
@@ -11916,584 +10981,6 @@
   <p:cSld>
     <p:spTree>
       <p:nvGrpSpPr>
-        <p:cNvPr id="1" name="Shape 88"/>
-        <p:cNvGrpSpPr/>
-        <p:nvPr/>
-      </p:nvGrpSpPr>
-      <p:grpSpPr>
-        <a:xfrm>
-          <a:off x="0" y="0"/>
-          <a:ext cx="0" cy="0"/>
-          <a:chOff x="0" y="0"/>
-          <a:chExt cx="0" cy="0"/>
-        </a:xfrm>
-      </p:grpSpPr>
-      <p:pic>
-        <p:nvPicPr>
-          <p:cNvPr id="89" name="Google Shape;89;p13"/>
-          <p:cNvPicPr preferRelativeResize="0"/>
-          <p:nvPr/>
-        </p:nvPicPr>
-        <p:blipFill rotWithShape="1">
-          <a:blip r:embed="rId3">
-            <a:alphaModFix/>
-          </a:blip>
-          <a:srcRect/>
-          <a:stretch/>
-        </p:blipFill>
-        <p:spPr>
-          <a:xfrm>
-            <a:off x="0" y="857572"/>
-            <a:ext cx="9144000" cy="5142857"/>
-          </a:xfrm>
-          <a:prstGeom prst="rect">
-            <a:avLst/>
-          </a:prstGeom>
-          <a:noFill/>
-          <a:ln>
-            <a:noFill/>
-          </a:ln>
-        </p:spPr>
-      </p:pic>
-      <p:sp>
-        <p:nvSpPr>
-          <p:cNvPr id="90" name="Google Shape;90;p13"/>
-          <p:cNvSpPr/>
-          <p:nvPr/>
-        </p:nvSpPr>
-        <p:spPr>
-          <a:xfrm>
-            <a:off x="621792" y="1845946"/>
-            <a:ext cx="6807709" cy="2367152"/>
-          </a:xfrm>
-          <a:prstGeom prst="rect">
-            <a:avLst/>
-          </a:prstGeom>
-          <a:solidFill>
-            <a:schemeClr val="lt1"/>
-          </a:solidFill>
-          <a:ln w="12700" cap="flat" cmpd="sng">
-            <a:solidFill>
-              <a:srgbClr val="C3D7F4"/>
-            </a:solidFill>
-            <a:prstDash val="solid"/>
-            <a:miter lim="800000"/>
-            <a:headEnd type="none" w="sm" len="sm"/>
-            <a:tailEnd type="none" w="sm" len="sm"/>
-          </a:ln>
-        </p:spPr>
-        <p:txBody>
-          <a:bodyPr spcFirstLastPara="1" wrap="square" lIns="68569" tIns="34275" rIns="68569" bIns="34275" anchor="ctr" anchorCtr="0">
-            <a:noAutofit/>
-          </a:bodyPr>
-          <a:lstStyle/>
-          <a:p>
-            <a:pPr algn="ctr"/>
-            <a:endParaRPr sz="1350">
-              <a:solidFill>
-                <a:schemeClr val="lt1"/>
-              </a:solidFill>
-            </a:endParaRPr>
-          </a:p>
-        </p:txBody>
-      </p:sp>
-      <p:sp>
-        <p:nvSpPr>
-          <p:cNvPr id="92" name="Google Shape;92;p13"/>
-          <p:cNvSpPr txBox="1"/>
-          <p:nvPr/>
-        </p:nvSpPr>
-        <p:spPr>
-          <a:xfrm>
-            <a:off x="2217534" y="1985438"/>
-            <a:ext cx="3608794" cy="484718"/>
-          </a:xfrm>
-          <a:prstGeom prst="rect">
-            <a:avLst/>
-          </a:prstGeom>
-          <a:noFill/>
-          <a:ln>
-            <a:noFill/>
-          </a:ln>
-        </p:spPr>
-        <p:txBody>
-          <a:bodyPr spcFirstLastPara="1" wrap="square" lIns="68569" tIns="34275" rIns="68569" bIns="34275" anchor="t" anchorCtr="0">
-            <a:spAutoFit/>
-          </a:bodyPr>
-          <a:lstStyle/>
-          <a:p>
-            <a:pPr algn="ctr"/>
-            <a:r>
-              <a:rPr lang="en-US" sz="2700" b="1">
-                <a:solidFill>
-                  <a:schemeClr val="dk1"/>
-                </a:solidFill>
-                <a:latin typeface="Open Sans"/>
-                <a:ea typeface="Open Sans"/>
-                <a:cs typeface="Open Sans"/>
-                <a:sym typeface="Open Sans"/>
-              </a:rPr>
-              <a:t>GIẤY CHỨNG NHẬN</a:t>
-            </a:r>
-            <a:endParaRPr sz="2700" b="1">
-              <a:solidFill>
-                <a:schemeClr val="dk1"/>
-              </a:solidFill>
-              <a:latin typeface="Open Sans"/>
-              <a:ea typeface="Open Sans"/>
-              <a:cs typeface="Open Sans"/>
-              <a:sym typeface="Open Sans"/>
-            </a:endParaRPr>
-          </a:p>
-        </p:txBody>
-      </p:sp>
-      <p:sp>
-        <p:nvSpPr>
-          <p:cNvPr id="93" name="Google Shape;93;p13"/>
-          <p:cNvSpPr txBox="1"/>
-          <p:nvPr/>
-        </p:nvSpPr>
-        <p:spPr>
-          <a:xfrm>
-            <a:off x="2792777" y="2385654"/>
-            <a:ext cx="2458306" cy="253885"/>
-          </a:xfrm>
-          <a:prstGeom prst="rect">
-            <a:avLst/>
-          </a:prstGeom>
-          <a:noFill/>
-          <a:ln>
-            <a:noFill/>
-          </a:ln>
-        </p:spPr>
-        <p:txBody>
-          <a:bodyPr spcFirstLastPara="1" wrap="square" lIns="68569" tIns="34275" rIns="68569" bIns="34275" anchor="t" anchorCtr="0">
-            <a:spAutoFit/>
-          </a:bodyPr>
-          <a:lstStyle/>
-          <a:p>
-            <a:pPr algn="ctr"/>
-            <a:r>
-              <a:rPr lang="en-US" sz="1200">
-                <a:solidFill>
-                  <a:schemeClr val="dk1"/>
-                </a:solidFill>
-                <a:latin typeface="Open Sans"/>
-                <a:ea typeface="Open Sans"/>
-                <a:cs typeface="Open Sans"/>
-                <a:sym typeface="Open Sans"/>
-              </a:rPr>
-              <a:t>CERTIFICATE OF COMPLETION</a:t>
-            </a:r>
-            <a:endParaRPr sz="1200">
-              <a:solidFill>
-                <a:schemeClr val="dk1"/>
-              </a:solidFill>
-              <a:latin typeface="Open Sans"/>
-              <a:ea typeface="Open Sans"/>
-              <a:cs typeface="Open Sans"/>
-              <a:sym typeface="Open Sans"/>
-            </a:endParaRPr>
-          </a:p>
-        </p:txBody>
-      </p:sp>
-      <p:sp>
-        <p:nvSpPr>
-          <p:cNvPr id="95" name="Google Shape;95;p13"/>
-          <p:cNvSpPr txBox="1"/>
-          <p:nvPr/>
-        </p:nvSpPr>
-        <p:spPr>
-          <a:xfrm>
-            <a:off x="892969" y="3480211"/>
-            <a:ext cx="6257924" cy="230802"/>
-          </a:xfrm>
-          <a:prstGeom prst="rect">
-            <a:avLst/>
-          </a:prstGeom>
-          <a:noFill/>
-          <a:ln>
-            <a:noFill/>
-          </a:ln>
-        </p:spPr>
-        <p:txBody>
-          <a:bodyPr spcFirstLastPara="1" wrap="square" lIns="68569" tIns="34275" rIns="68569" bIns="34275" anchor="t" anchorCtr="0">
-            <a:spAutoFit/>
-          </a:bodyPr>
-          <a:lstStyle/>
-          <a:p>
-            <a:pPr algn="just"/>
-            <a:endParaRPr sz="1050">
-              <a:latin typeface="Open Sans Medium"/>
-              <a:ea typeface="Open Sans Medium"/>
-              <a:cs typeface="Open Sans Medium"/>
-              <a:sym typeface="Open Sans Medium"/>
-            </a:endParaRPr>
-          </a:p>
-        </p:txBody>
-      </p:sp>
-      <p:sp>
-        <p:nvSpPr>
-          <p:cNvPr id="96" name="Google Shape;96;p13"/>
-          <p:cNvSpPr/>
-          <p:nvPr/>
-        </p:nvSpPr>
-        <p:spPr>
-          <a:xfrm>
-            <a:off x="1945385" y="3297137"/>
-            <a:ext cx="4160520" cy="27000"/>
-          </a:xfrm>
-          <a:prstGeom prst="rect">
-            <a:avLst/>
-          </a:prstGeom>
-          <a:gradFill>
-            <a:gsLst>
-              <a:gs pos="0">
-                <a:srgbClr val="ED3330"/>
-              </a:gs>
-              <a:gs pos="33000">
-                <a:srgbClr val="1BA94A"/>
-              </a:gs>
-              <a:gs pos="66000">
-                <a:srgbClr val="487CBF"/>
-              </a:gs>
-              <a:gs pos="100000">
-                <a:srgbClr val="FCB614"/>
-              </a:gs>
-            </a:gsLst>
-            <a:lin ang="0" scaled="0"/>
-          </a:gradFill>
-          <a:ln>
-            <a:noFill/>
-          </a:ln>
-        </p:spPr>
-        <p:txBody>
-          <a:bodyPr spcFirstLastPara="1" wrap="square" lIns="68569" tIns="34275" rIns="68569" bIns="34275" anchor="ctr" anchorCtr="0">
-            <a:noAutofit/>
-          </a:bodyPr>
-          <a:lstStyle/>
-          <a:p>
-            <a:pPr algn="ctr"/>
-            <a:endParaRPr sz="1350">
-              <a:solidFill>
-                <a:schemeClr val="lt1"/>
-              </a:solidFill>
-            </a:endParaRPr>
-          </a:p>
-        </p:txBody>
-      </p:sp>
-      <p:sp>
-        <p:nvSpPr>
-          <p:cNvPr id="97" name="Google Shape;97;p13"/>
-          <p:cNvSpPr/>
-          <p:nvPr/>
-        </p:nvSpPr>
-        <p:spPr>
-          <a:xfrm>
-            <a:off x="1435894" y="4412974"/>
-            <a:ext cx="5464969" cy="876627"/>
-          </a:xfrm>
-          <a:prstGeom prst="rect">
-            <a:avLst/>
-          </a:prstGeom>
-          <a:solidFill>
-            <a:schemeClr val="lt1"/>
-          </a:solidFill>
-          <a:ln w="12700" cap="flat" cmpd="sng">
-            <a:solidFill>
-              <a:srgbClr val="C3D7F4"/>
-            </a:solidFill>
-            <a:prstDash val="solid"/>
-            <a:miter lim="800000"/>
-            <a:headEnd type="none" w="sm" len="sm"/>
-            <a:tailEnd type="none" w="sm" len="sm"/>
-          </a:ln>
-        </p:spPr>
-        <p:txBody>
-          <a:bodyPr spcFirstLastPara="1" wrap="square" lIns="68569" tIns="34275" rIns="68569" bIns="34275" anchor="ctr" anchorCtr="0">
-            <a:noAutofit/>
-          </a:bodyPr>
-          <a:lstStyle/>
-          <a:p>
-            <a:pPr algn="ctr"/>
-            <a:endParaRPr sz="1350">
-              <a:solidFill>
-                <a:schemeClr val="lt1"/>
-              </a:solidFill>
-            </a:endParaRPr>
-          </a:p>
-        </p:txBody>
-      </p:sp>
-      <p:sp>
-        <p:nvSpPr>
-          <p:cNvPr id="99" name="Google Shape;99;p13"/>
-          <p:cNvSpPr txBox="1"/>
-          <p:nvPr/>
-        </p:nvSpPr>
-        <p:spPr>
-          <a:xfrm>
-            <a:off x="6026380" y="4485893"/>
-            <a:ext cx="1403120" cy="230802"/>
-          </a:xfrm>
-          <a:prstGeom prst="rect">
-            <a:avLst/>
-          </a:prstGeom>
-          <a:noFill/>
-          <a:ln>
-            <a:noFill/>
-          </a:ln>
-        </p:spPr>
-        <p:txBody>
-          <a:bodyPr spcFirstLastPara="1" wrap="square" lIns="68569" tIns="34275" rIns="68569" bIns="34275" anchor="t" anchorCtr="0">
-            <a:spAutoFit/>
-          </a:bodyPr>
-          <a:lstStyle/>
-          <a:p>
-            <a:pPr marL="38100"/>
-            <a:r>
-              <a:rPr lang="en-US" sz="1050">
-                <a:solidFill>
-                  <a:srgbClr val="555555"/>
-                </a:solidFill>
-              </a:rPr>
-              <a:t> </a:t>
-            </a:r>
-            <a:endParaRPr sz="1050">
-              <a:solidFill>
-                <a:srgbClr val="555555"/>
-              </a:solidFill>
-            </a:endParaRPr>
-          </a:p>
-        </p:txBody>
-      </p:sp>
-      <p:pic>
-        <p:nvPicPr>
-          <p:cNvPr id="101" name="Google Shape;101;p13"/>
-          <p:cNvPicPr preferRelativeResize="0"/>
-          <p:nvPr/>
-        </p:nvPicPr>
-        <p:blipFill rotWithShape="1">
-          <a:blip r:embed="rId4">
-            <a:alphaModFix/>
-          </a:blip>
-          <a:srcRect l="15592" t="34080" r="7581" b="13409"/>
-          <a:stretch/>
-        </p:blipFill>
-        <p:spPr>
-          <a:xfrm>
-            <a:off x="1541578" y="4604285"/>
-            <a:ext cx="1403120" cy="540000"/>
-          </a:xfrm>
-          <a:prstGeom prst="rect">
-            <a:avLst/>
-          </a:prstGeom>
-          <a:noFill/>
-          <a:ln>
-            <a:noFill/>
-          </a:ln>
-        </p:spPr>
-      </p:pic>
-      <p:sp>
-        <p:nvSpPr>
-          <p:cNvPr id="102" name="Google Shape;102;p13"/>
-          <p:cNvSpPr txBox="1"/>
-          <p:nvPr/>
-        </p:nvSpPr>
-        <p:spPr>
-          <a:xfrm>
-            <a:off x="2944698" y="4453304"/>
-            <a:ext cx="3963010" cy="807883"/>
-          </a:xfrm>
-          <a:prstGeom prst="rect">
-            <a:avLst/>
-          </a:prstGeom>
-          <a:noFill/>
-          <a:ln>
-            <a:noFill/>
-          </a:ln>
-        </p:spPr>
-        <p:txBody>
-          <a:bodyPr spcFirstLastPara="1" wrap="square" lIns="68569" tIns="34275" rIns="68569" bIns="34275" anchor="ctr" anchorCtr="0">
-            <a:spAutoFit/>
-          </a:bodyPr>
-          <a:lstStyle/>
-          <a:p>
-            <a:pPr marL="38100"/>
-            <a:r>
-              <a:rPr lang="en-US" sz="1200">
-                <a:solidFill>
-                  <a:srgbClr val="555555"/>
-                </a:solidFill>
-                <a:latin typeface="Open Sans"/>
-                <a:ea typeface="Open Sans"/>
-                <a:cs typeface="Open Sans"/>
-                <a:sym typeface="Open Sans"/>
-              </a:rPr>
-              <a:t> </a:t>
-            </a:r>
-            <a:r>
-              <a:rPr lang="en-US" sz="1200">
-                <a:solidFill>
-                  <a:srgbClr val="3D85C6"/>
-                </a:solidFill>
-                <a:latin typeface="Open Sans"/>
-                <a:ea typeface="Open Sans"/>
-                <a:cs typeface="Open Sans"/>
-                <a:sym typeface="Open Sans"/>
-              </a:rPr>
-              <a:t>•</a:t>
-            </a:r>
-            <a:r>
-              <a:rPr lang="en-US" sz="1200">
-                <a:solidFill>
-                  <a:srgbClr val="555555"/>
-                </a:solidFill>
-                <a:latin typeface="Open Sans"/>
-                <a:ea typeface="Open Sans"/>
-                <a:cs typeface="Open Sans"/>
-                <a:sym typeface="Open Sans"/>
-              </a:rPr>
-              <a:t>  </a:t>
-            </a:r>
-            <a:endParaRPr sz="1050">
-              <a:latin typeface="Open Sans"/>
-              <a:ea typeface="Open Sans"/>
-              <a:cs typeface="Open Sans"/>
-              <a:sym typeface="Open Sans"/>
-            </a:endParaRPr>
-          </a:p>
-          <a:p>
-            <a:pPr marL="38100"/>
-            <a:r>
-              <a:rPr lang="en-US" sz="1200">
-                <a:solidFill>
-                  <a:srgbClr val="555555"/>
-                </a:solidFill>
-                <a:latin typeface="Open Sans"/>
-                <a:ea typeface="Open Sans"/>
-                <a:cs typeface="Open Sans"/>
-                <a:sym typeface="Open Sans"/>
-              </a:rPr>
-              <a:t> </a:t>
-            </a:r>
-            <a:r>
-              <a:rPr lang="en-US" sz="1200">
-                <a:solidFill>
-                  <a:srgbClr val="FF0000"/>
-                </a:solidFill>
-                <a:latin typeface="Open Sans"/>
-                <a:ea typeface="Open Sans"/>
-                <a:cs typeface="Open Sans"/>
-                <a:sym typeface="Open Sans"/>
-              </a:rPr>
-              <a:t>•</a:t>
-            </a:r>
-            <a:r>
-              <a:rPr lang="en-US" sz="1200">
-                <a:solidFill>
-                  <a:srgbClr val="555555"/>
-                </a:solidFill>
-                <a:latin typeface="Open Sans"/>
-                <a:ea typeface="Open Sans"/>
-                <a:cs typeface="Open Sans"/>
-                <a:sym typeface="Open Sans"/>
-              </a:rPr>
-              <a:t>  Cuong Le Van (Mr.)</a:t>
-            </a:r>
-            <a:endParaRPr sz="1200">
-              <a:solidFill>
-                <a:srgbClr val="555555"/>
-              </a:solidFill>
-              <a:latin typeface="Open Sans"/>
-              <a:ea typeface="Open Sans"/>
-              <a:cs typeface="Open Sans"/>
-              <a:sym typeface="Open Sans"/>
-            </a:endParaRPr>
-          </a:p>
-          <a:p>
-            <a:pPr marL="38100"/>
-            <a:r>
-              <a:rPr lang="en-US" sz="1200">
-                <a:solidFill>
-                  <a:srgbClr val="555555"/>
-                </a:solidFill>
-                <a:latin typeface="Open Sans"/>
-                <a:ea typeface="Open Sans"/>
-                <a:cs typeface="Open Sans"/>
-                <a:sym typeface="Open Sans"/>
-              </a:rPr>
-              <a:t> </a:t>
-            </a:r>
-            <a:r>
-              <a:rPr lang="en-US" sz="1200">
-                <a:solidFill>
-                  <a:srgbClr val="FFCC33"/>
-                </a:solidFill>
-                <a:latin typeface="Open Sans"/>
-                <a:ea typeface="Open Sans"/>
-                <a:cs typeface="Open Sans"/>
-                <a:sym typeface="Open Sans"/>
-              </a:rPr>
-              <a:t>•</a:t>
-            </a:r>
-            <a:r>
-              <a:rPr lang="en-US" sz="1200">
-                <a:solidFill>
-                  <a:srgbClr val="555555"/>
-                </a:solidFill>
-                <a:latin typeface="Open Sans"/>
-                <a:ea typeface="Open Sans"/>
-                <a:cs typeface="Open Sans"/>
-                <a:sym typeface="Open Sans"/>
-              </a:rPr>
-              <a:t>  Google Developer Students Clubs HCMUTE Lead</a:t>
-            </a:r>
-            <a:endParaRPr sz="1050">
-              <a:latin typeface="Open Sans"/>
-              <a:ea typeface="Open Sans"/>
-              <a:cs typeface="Open Sans"/>
-              <a:sym typeface="Open Sans"/>
-            </a:endParaRPr>
-          </a:p>
-          <a:p>
-            <a:pPr marL="38100"/>
-            <a:r>
-              <a:rPr lang="en-US" sz="1200">
-                <a:solidFill>
-                  <a:srgbClr val="6AA84F"/>
-                </a:solidFill>
-                <a:latin typeface="Open Sans"/>
-                <a:ea typeface="Open Sans"/>
-                <a:cs typeface="Open Sans"/>
-                <a:sym typeface="Open Sans"/>
-              </a:rPr>
-              <a:t> •  </a:t>
-            </a:r>
-            <a:endParaRPr sz="1200">
-              <a:solidFill>
-                <a:srgbClr val="555555"/>
-              </a:solidFill>
-              <a:latin typeface="Open Sans"/>
-              <a:ea typeface="Open Sans"/>
-              <a:cs typeface="Open Sans"/>
-              <a:sym typeface="Open Sans"/>
-            </a:endParaRPr>
-          </a:p>
-        </p:txBody>
-      </p:sp>
-    </p:spTree>
-  </p:cSld>
-  <p:clrMapOvr>
-    <a:masterClrMapping/>
-  </p:clrMapOvr>
-</p:sld>
-</file>
-
-<file path=ppt/slides/slide2.xml><?xml version="1.0" encoding="utf-8"?>
-<p:sld xmlns:a="http://schemas.openxmlformats.org/drawingml/2006/main" xmlns:r="http://schemas.openxmlformats.org/officeDocument/2006/relationships" xmlns:p="http://schemas.openxmlformats.org/presentationml/2006/main">
-  <p:cSld>
-    <p:spTree>
-      <p:nvGrpSpPr>
         <p:cNvPr id="1" name=""/>
         <p:cNvGrpSpPr/>
         <p:nvPr/>
@@ -13061,7 +11548,7 @@
         </p:nvCxnSpPr>
         <p:spPr>
           <a:xfrm flipV="1">
-            <a:off x="5956706" y="6095986"/>
+            <a:off x="5956706" y="6333730"/>
             <a:ext cx="2395823" cy="12700"/>
           </a:xfrm>
           <a:prstGeom prst="line">
@@ -14117,6 +12604,98 @@
           </p:txBody>
         </p:sp>
       </p:grpSp>
+      <p:pic>
+        <p:nvPicPr>
+          <p:cNvPr id="3" name="Picture 2">
+            <a:extLst>
+              <a:ext uri="{FF2B5EF4-FFF2-40B4-BE49-F238E27FC236}">
+                <a16:creationId xmlns:a16="http://schemas.microsoft.com/office/drawing/2014/main" id="{9D2AFE76-C95F-72CE-C2E4-C4512C40BF13}"/>
+              </a:ext>
+            </a:extLst>
+          </p:cNvPr>
+          <p:cNvPicPr>
+            <a:picLocks noChangeAspect="1"/>
+          </p:cNvPicPr>
+          <p:nvPr/>
+        </p:nvPicPr>
+        <p:blipFill>
+          <a:blip r:embed="rId5">
+            <a:extLst>
+              <a:ext uri="{BEBA8EAE-BF5A-486C-A8C5-ECC9F3942E4B}">
+                <a14:imgProps xmlns:a14="http://schemas.microsoft.com/office/drawing/2010/main">
+                  <a14:imgLayer r:embed="rId6">
+                    <a14:imgEffect>
+                      <a14:brightnessContrast bright="-100000" contrast="100000"/>
+                    </a14:imgEffect>
+                  </a14:imgLayer>
+                </a14:imgProps>
+              </a:ext>
+            </a:extLst>
+          </a:blip>
+          <a:stretch>
+            <a:fillRect/>
+          </a:stretch>
+        </p:blipFill>
+        <p:spPr>
+          <a:xfrm>
+            <a:off x="6483640" y="4840647"/>
+            <a:ext cx="1246240" cy="1838252"/>
+          </a:xfrm>
+          <a:prstGeom prst="rect">
+            <a:avLst/>
+          </a:prstGeom>
+          <a:ln>
+            <a:noFill/>
+          </a:ln>
+          <a:effectLst>
+            <a:innerShdw blurRad="1270000" dist="2540000" dir="21540000">
+              <a:prstClr val="black"/>
+            </a:innerShdw>
+          </a:effectLst>
+        </p:spPr>
+      </p:pic>
+      <p:sp>
+        <p:nvSpPr>
+          <p:cNvPr id="7" name="TextBox 6">
+            <a:extLst>
+              <a:ext uri="{FF2B5EF4-FFF2-40B4-BE49-F238E27FC236}">
+                <a16:creationId xmlns:a16="http://schemas.microsoft.com/office/drawing/2014/main" id="{95803954-621D-BE4D-DA31-8F26B68ADDED}"/>
+              </a:ext>
+            </a:extLst>
+          </p:cNvPr>
+          <p:cNvSpPr txBox="1"/>
+          <p:nvPr/>
+        </p:nvSpPr>
+        <p:spPr>
+          <a:xfrm>
+            <a:off x="6096347" y="6028845"/>
+            <a:ext cx="2256182" cy="338554"/>
+          </a:xfrm>
+          <a:prstGeom prst="rect">
+            <a:avLst/>
+          </a:prstGeom>
+          <a:noFill/>
+        </p:spPr>
+        <p:txBody>
+          <a:bodyPr wrap="square">
+            <a:spAutoFit/>
+          </a:bodyPr>
+          <a:lstStyle/>
+          <a:p>
+            <a:pPr algn="ctr"/>
+            <a:r>
+              <a:rPr lang="en-US" sz="1600" b="1" i="1">
+                <a:solidFill>
+                  <a:srgbClr val="557296"/>
+                </a:solidFill>
+                <a:latin typeface="Times New Roman" panose="02020603050405020304" pitchFamily="18" charset="0"/>
+                <a:cs typeface="Times New Roman" panose="02020603050405020304" pitchFamily="18" charset="0"/>
+              </a:rPr>
+              <a:t>Lê Văn Cường</a:t>
+            </a:r>
+          </a:p>
+        </p:txBody>
+      </p:sp>
     </p:spTree>
     <p:extLst>
       <p:ext uri="{BB962C8B-B14F-4D97-AF65-F5344CB8AC3E}">

</xml_diff>